<commit_message>
June committee meeting minutes
</commit_message>
<xml_diff>
--- a/2013/committeeMeetingNotes/CommitteeMinutes20130611.pptx
+++ b/2013/committeeMeetingNotes/CommitteeMinutes20130611.pptx
@@ -5,12 +5,11 @@
     <p:sldMasterId id="2147483648" r:id="rId1"/>
   </p:sldMasterIdLst>
   <p:notesMasterIdLst>
-    <p:notesMasterId r:id="rId5"/>
+    <p:notesMasterId r:id="rId4"/>
   </p:notesMasterIdLst>
   <p:sldIdLst>
     <p:sldId id="256" r:id="rId2"/>
-    <p:sldId id="259" r:id="rId3"/>
-    <p:sldId id="260" r:id="rId4"/>
+    <p:sldId id="260" r:id="rId3"/>
   </p:sldIdLst>
   <p:sldSz cx="9144000" cy="6858000" type="screen4x3"/>
   <p:notesSz cx="6858000" cy="9144000"/>
@@ -194,7 +193,7 @@
           <a:p>
             <a:fld id="{9F521EA1-EA37-FC47-A492-F655681A3B81}" type="datetimeFigureOut">
               <a:rPr lang="en-US" smtClean="0"/>
-              <a:t>6/11/13</a:t>
+              <a:t>6/22/13</a:t>
             </a:fld>
             <a:endParaRPr lang="en-US"/>
           </a:p>
@@ -546,90 +545,6 @@
 </p:notes>
 </file>
 
-<file path=ppt/notesSlides/notesSlide2.xml><?xml version="1.0" encoding="utf-8"?>
-<p:notes xmlns:a="http://schemas.openxmlformats.org/drawingml/2006/main" xmlns:r="http://schemas.openxmlformats.org/officeDocument/2006/relationships" xmlns:p="http://schemas.openxmlformats.org/presentationml/2006/main">
-  <p:cSld>
-    <p:spTree>
-      <p:nvGrpSpPr>
-        <p:cNvPr id="1" name=""/>
-        <p:cNvGrpSpPr/>
-        <p:nvPr/>
-      </p:nvGrpSpPr>
-      <p:grpSpPr>
-        <a:xfrm>
-          <a:off x="0" y="0"/>
-          <a:ext cx="0" cy="0"/>
-          <a:chOff x="0" y="0"/>
-          <a:chExt cx="0" cy="0"/>
-        </a:xfrm>
-      </p:grpSpPr>
-      <p:sp>
-        <p:nvSpPr>
-          <p:cNvPr id="2" name="Slide Image Placeholder 1"/>
-          <p:cNvSpPr>
-            <a:spLocks noGrp="1" noRot="1" noChangeAspect="1"/>
-          </p:cNvSpPr>
-          <p:nvPr>
-            <p:ph type="sldImg"/>
-          </p:nvPr>
-        </p:nvSpPr>
-        <p:spPr/>
-      </p:sp>
-      <p:sp>
-        <p:nvSpPr>
-          <p:cNvPr id="3" name="Notes Placeholder 2"/>
-          <p:cNvSpPr>
-            <a:spLocks noGrp="1"/>
-          </p:cNvSpPr>
-          <p:nvPr>
-            <p:ph type="body" idx="1"/>
-          </p:nvPr>
-        </p:nvSpPr>
-        <p:spPr/>
-        <p:txBody>
-          <a:bodyPr/>
-          <a:lstStyle/>
-          <a:p>
-            <a:endParaRPr lang="en-US" dirty="0"/>
-          </a:p>
-        </p:txBody>
-      </p:sp>
-      <p:sp>
-        <p:nvSpPr>
-          <p:cNvPr id="4" name="Slide Number Placeholder 3"/>
-          <p:cNvSpPr>
-            <a:spLocks noGrp="1"/>
-          </p:cNvSpPr>
-          <p:nvPr>
-            <p:ph type="sldNum" sz="quarter" idx="10"/>
-          </p:nvPr>
-        </p:nvSpPr>
-        <p:spPr/>
-        <p:txBody>
-          <a:bodyPr/>
-          <a:lstStyle/>
-          <a:p>
-            <a:fld id="{27652DA9-6FA8-0B40-BC97-5B595DEB8599}" type="slidenum">
-              <a:rPr lang="en-US" smtClean="0"/>
-              <a:t>2</a:t>
-            </a:fld>
-            <a:endParaRPr lang="en-US"/>
-          </a:p>
-        </p:txBody>
-      </p:sp>
-    </p:spTree>
-    <p:extLst>
-      <p:ext uri="{BB962C8B-B14F-4D97-AF65-F5344CB8AC3E}">
-        <p14:creationId xmlns:p14="http://schemas.microsoft.com/office/powerpoint/2010/main" val="4079190614"/>
-      </p:ext>
-    </p:extLst>
-  </p:cSld>
-  <p:clrMapOvr>
-    <a:masterClrMapping/>
-  </p:clrMapOvr>
-</p:notes>
-</file>
-
 <file path=ppt/slideLayouts/slideLayout1.xml><?xml version="1.0" encoding="utf-8"?>
 <p:sldLayout xmlns:a="http://schemas.openxmlformats.org/drawingml/2006/main" xmlns:r="http://schemas.openxmlformats.org/officeDocument/2006/relationships" xmlns:p="http://schemas.openxmlformats.org/presentationml/2006/main" type="title" preserve="1">
   <p:cSld name="Title Slide">
@@ -812,7 +727,7 @@
             <a:fld id="{6E72629E-405B-44F0-B603-EFBC37526474}" type="datetimeFigureOut">
               <a:rPr lang="en-US" smtClean="0"/>
               <a:pPr/>
-              <a:t>6/11/13</a:t>
+              <a:t>6/22/13</a:t>
             </a:fld>
             <a:endParaRPr lang="en-US"/>
           </a:p>
@@ -979,7 +894,7 @@
             <a:fld id="{6E72629E-405B-44F0-B603-EFBC37526474}" type="datetimeFigureOut">
               <a:rPr lang="en-US" smtClean="0"/>
               <a:pPr/>
-              <a:t>6/11/13</a:t>
+              <a:t>6/22/13</a:t>
             </a:fld>
             <a:endParaRPr lang="en-US"/>
           </a:p>
@@ -1156,7 +1071,7 @@
             <a:fld id="{6E72629E-405B-44F0-B603-EFBC37526474}" type="datetimeFigureOut">
               <a:rPr lang="en-US" smtClean="0"/>
               <a:pPr/>
-              <a:t>6/11/13</a:t>
+              <a:t>6/22/13</a:t>
             </a:fld>
             <a:endParaRPr lang="en-US"/>
           </a:p>
@@ -1323,7 +1238,7 @@
             <a:fld id="{6E72629E-405B-44F0-B603-EFBC37526474}" type="datetimeFigureOut">
               <a:rPr lang="en-US" smtClean="0"/>
               <a:pPr/>
-              <a:t>6/11/13</a:t>
+              <a:t>6/22/13</a:t>
             </a:fld>
             <a:endParaRPr lang="en-US"/>
           </a:p>
@@ -1566,7 +1481,7 @@
             <a:fld id="{6E72629E-405B-44F0-B603-EFBC37526474}" type="datetimeFigureOut">
               <a:rPr lang="en-US" smtClean="0"/>
               <a:pPr/>
-              <a:t>6/11/13</a:t>
+              <a:t>6/22/13</a:t>
             </a:fld>
             <a:endParaRPr lang="en-US"/>
           </a:p>
@@ -1851,7 +1766,7 @@
             <a:fld id="{6E72629E-405B-44F0-B603-EFBC37526474}" type="datetimeFigureOut">
               <a:rPr lang="en-US" smtClean="0"/>
               <a:pPr/>
-              <a:t>6/11/13</a:t>
+              <a:t>6/22/13</a:t>
             </a:fld>
             <a:endParaRPr lang="en-US"/>
           </a:p>
@@ -2270,7 +2185,7 @@
             <a:fld id="{6E72629E-405B-44F0-B603-EFBC37526474}" type="datetimeFigureOut">
               <a:rPr lang="en-US" smtClean="0"/>
               <a:pPr/>
-              <a:t>6/11/13</a:t>
+              <a:t>6/22/13</a:t>
             </a:fld>
             <a:endParaRPr lang="en-US"/>
           </a:p>
@@ -2385,7 +2300,7 @@
             <a:fld id="{6E72629E-405B-44F0-B603-EFBC37526474}" type="datetimeFigureOut">
               <a:rPr lang="en-US" smtClean="0"/>
               <a:pPr/>
-              <a:t>6/11/13</a:t>
+              <a:t>6/22/13</a:t>
             </a:fld>
             <a:endParaRPr lang="en-US"/>
           </a:p>
@@ -2477,7 +2392,7 @@
             <a:fld id="{6E72629E-405B-44F0-B603-EFBC37526474}" type="datetimeFigureOut">
               <a:rPr lang="en-US" smtClean="0"/>
               <a:pPr/>
-              <a:t>6/11/13</a:t>
+              <a:t>6/22/13</a:t>
             </a:fld>
             <a:endParaRPr lang="en-US"/>
           </a:p>
@@ -2751,7 +2666,7 @@
             <a:fld id="{6E72629E-405B-44F0-B603-EFBC37526474}" type="datetimeFigureOut">
               <a:rPr lang="en-US" smtClean="0"/>
               <a:pPr/>
-              <a:t>6/11/13</a:t>
+              <a:t>6/22/13</a:t>
             </a:fld>
             <a:endParaRPr lang="en-US"/>
           </a:p>
@@ -3001,7 +2916,7 @@
             <a:fld id="{6E72629E-405B-44F0-B603-EFBC37526474}" type="datetimeFigureOut">
               <a:rPr lang="en-US" smtClean="0"/>
               <a:pPr/>
-              <a:t>6/11/13</a:t>
+              <a:t>6/22/13</a:t>
             </a:fld>
             <a:endParaRPr lang="en-US"/>
           </a:p>
@@ -3211,7 +3126,7 @@
             <a:fld id="{6E72629E-405B-44F0-B603-EFBC37526474}" type="datetimeFigureOut">
               <a:rPr lang="en-US" smtClean="0"/>
               <a:pPr/>
-              <a:t>6/11/13</a:t>
+              <a:t>6/22/13</a:t>
             </a:fld>
             <a:endParaRPr lang="en-US"/>
           </a:p>
@@ -3622,8 +3537,8 @@
         </p:nvSpPr>
         <p:spPr>
           <a:xfrm>
-            <a:off x="2037836" y="152400"/>
-            <a:ext cx="6069878" cy="584776"/>
+            <a:off x="2028538" y="152400"/>
+            <a:ext cx="6088476" cy="584776"/>
           </a:xfrm>
           <a:prstGeom prst="rect">
             <a:avLst/>
@@ -3639,7 +3554,19 @@
             <a:pPr algn="ctr"/>
             <a:r>
               <a:rPr lang="en-US" dirty="0" smtClean="0"/>
-              <a:t>Troop 457 Committee Meeting Notes Summary : May 21, 2013</a:t>
+              <a:t>Troop 457 Committee Meeting Notes Summary : </a:t>
+            </a:r>
+            <a:r>
+              <a:rPr lang="en-US" dirty="0" smtClean="0"/>
+              <a:t>June 1</a:t>
+            </a:r>
+            <a:r>
+              <a:rPr lang="en-US" dirty="0" smtClean="0"/>
+              <a:t>1</a:t>
+            </a:r>
+            <a:r>
+              <a:rPr lang="en-US" dirty="0" smtClean="0"/>
+              <a:t>, 2013</a:t>
             </a:r>
           </a:p>
           <a:p>
@@ -3652,17 +3579,7 @@
                   </a:schemeClr>
                 </a:solidFill>
               </a:rPr>
-              <a:t>(next meeting Tuesday, </a:t>
-            </a:r>
-            <a:r>
-              <a:rPr lang="en-US" sz="1400" dirty="0" smtClean="0">
-                <a:solidFill>
-                  <a:schemeClr val="accent2">
-                    <a:lumMod val="75000"/>
-                  </a:schemeClr>
-                </a:solidFill>
-              </a:rPr>
-              <a:t>July </a:t>
+              <a:t>(next meeting Tuesday, July </a:t>
             </a:r>
             <a:r>
               <a:rPr lang="en-US" sz="1400" b="1" dirty="0" smtClean="0">
@@ -3824,13 +3741,7 @@
                 <a:rPr lang="en-US" sz="1000" b="1" dirty="0" smtClean="0">
                   <a:latin typeface="Perpetua" pitchFamily="18" charset="0"/>
                 </a:rPr>
-                <a:t>Balance: $ </a:t>
-              </a:r>
-              <a:r>
-                <a:rPr lang="en-US" sz="1000" b="1" dirty="0" smtClean="0">
-                  <a:latin typeface="Perpetua" pitchFamily="18" charset="0"/>
-                </a:rPr>
-                <a:t>9297</a:t>
+                <a:t>Balance: $ 9297</a:t>
               </a:r>
               <a:endParaRPr lang="en-US" sz="1000" b="1" u="sng" dirty="0" smtClean="0">
                 <a:latin typeface="Perpetua" pitchFamily="18" charset="0"/>
@@ -3857,13 +3768,13 @@
                 <a:rPr lang="en-US" sz="1000" b="1" dirty="0" smtClean="0">
                   <a:latin typeface="Perpetua" pitchFamily="18" charset="0"/>
                 </a:rPr>
-                <a:t> </a:t>
+                <a:t>  </a:t>
               </a:r>
               <a:r>
                 <a:rPr lang="en-US" sz="1000" b="1" dirty="0" smtClean="0">
                   <a:latin typeface="Perpetua" pitchFamily="18" charset="0"/>
                 </a:rPr>
-                <a:t> Looking for new Treasurer</a:t>
+                <a:t>Jenny Sun has agreed to become our new treasurer!</a:t>
               </a:r>
               <a:endParaRPr lang="en-US" sz="1000" b="1" dirty="0" smtClean="0">
                 <a:latin typeface="Perpetua" pitchFamily="18" charset="0"/>
@@ -4011,11 +3922,26 @@
                 <a:rPr lang="en-US" sz="1000" b="1" dirty="0" smtClean="0">
                   <a:latin typeface="Perpetua" pitchFamily="18" charset="0"/>
                 </a:rPr>
-                <a:t>Roy is scheduling his Eagle board of review</a:t>
+                <a:t>Roy </a:t>
               </a:r>
-              <a:endParaRPr lang="en-US" sz="1000" b="1" dirty="0" smtClean="0">
-                <a:latin typeface="Perpetua" pitchFamily="18" charset="0"/>
-              </a:endParaRPr>
+              <a:r>
+                <a:rPr lang="en-US" sz="1000" b="1" dirty="0" err="1" smtClean="0">
+                  <a:latin typeface="Perpetua" pitchFamily="18" charset="0"/>
+                </a:rPr>
+                <a:t>Gilboa</a:t>
+              </a:r>
+              <a:r>
+                <a:rPr lang="en-US" sz="1000" b="1" dirty="0" smtClean="0">
+                  <a:latin typeface="Perpetua" pitchFamily="18" charset="0"/>
+                </a:rPr>
+                <a:t> </a:t>
+              </a:r>
+              <a:r>
+                <a:rPr lang="en-US" sz="1000" b="1" dirty="0" smtClean="0">
+                  <a:latin typeface="Perpetua" pitchFamily="18" charset="0"/>
+                </a:rPr>
+                <a:t>is scheduling his Eagle board of review</a:t>
+              </a:r>
             </a:p>
             <a:p>
               <a:pPr>
@@ -4028,21 +3954,17 @@
                 </a:rPr>
                 <a:t> </a:t>
               </a:r>
+              <a:r>
+                <a:rPr lang="en-US" sz="1000" b="1" dirty="0" smtClean="0">
+                  <a:latin typeface="Perpetua" pitchFamily="18" charset="0"/>
+                </a:rPr>
+                <a:t>Advancement Coordinator is preparing for lots of merit badges this summer and @ summer camp.</a:t>
+              </a:r>
               <a:endParaRPr lang="en-US" sz="1000" b="1" dirty="0" smtClean="0">
                 <a:latin typeface="Perpetua" pitchFamily="18" charset="0"/>
               </a:endParaRPr>
             </a:p>
             <a:p>
-              <a:pPr>
-                <a:buFont typeface="Wingdings" pitchFamily="2" charset="2"/>
-                <a:buChar char="Ø"/>
-              </a:pPr>
-              <a:r>
-                <a:rPr lang="en-US" sz="1000" b="1" dirty="0">
-                  <a:latin typeface="Perpetua" pitchFamily="18" charset="0"/>
-                </a:rPr>
-                <a:t> </a:t>
-              </a:r>
               <a:endParaRPr lang="en-US" sz="1000" b="1" dirty="0" smtClean="0">
                 <a:latin typeface="Perpetua" pitchFamily="18" charset="0"/>
               </a:endParaRPr>
@@ -4192,32 +4114,17 @@
                 <a:rPr lang="en-US" sz="1000" b="1" dirty="0" smtClean="0">
                   <a:latin typeface="Perpetua" pitchFamily="18" charset="0"/>
                 </a:rPr>
-                <a:t> No required items.</a:t>
+                <a:t> No required </a:t>
               </a:r>
-            </a:p>
-            <a:p>
-              <a:pPr>
-                <a:buFont typeface="Wingdings" pitchFamily="2" charset="2"/>
-                <a:buChar char="Ø"/>
-              </a:pPr>
               <a:r>
                 <a:rPr lang="en-US" sz="1000" b="1" dirty="0" smtClean="0">
                   <a:latin typeface="Perpetua" pitchFamily="18" charset="0"/>
                 </a:rPr>
-                <a:t> </a:t>
+                <a:t>items</a:t>
               </a:r>
-            </a:p>
-            <a:p>
-              <a:pPr>
-                <a:buFont typeface="Wingdings" pitchFamily="2" charset="2"/>
-                <a:buChar char="Ø"/>
-              </a:pPr>
-              <a:r>
-                <a:rPr lang="en-US" sz="1000" b="1" dirty="0" smtClean="0">
-                  <a:latin typeface="Perpetua" pitchFamily="18" charset="0"/>
-                </a:rPr>
-                <a:t> </a:t>
-              </a:r>
+              <a:endParaRPr lang="en-US" sz="1000" b="1" dirty="0" smtClean="0">
+                <a:latin typeface="Perpetua" pitchFamily="18" charset="0"/>
+              </a:endParaRPr>
             </a:p>
           </p:txBody>
         </p:sp>
@@ -4341,73 +4248,19 @@
               <a:rPr lang="en-US" sz="1000" b="1" dirty="0" smtClean="0">
                 <a:latin typeface="Perpetua" pitchFamily="18" charset="0"/>
               </a:rPr>
-              <a:t> Need </a:t>
+              <a:t> </a:t>
             </a:r>
             <a:r>
               <a:rPr lang="en-US" sz="1000" b="1" dirty="0" smtClean="0">
                 <a:latin typeface="Perpetua" pitchFamily="18" charset="0"/>
               </a:rPr>
-              <a:t>swimming pool for Thursday evening usage before summer camp for: a) </a:t>
-            </a:r>
-            <a:r>
-              <a:rPr lang="en-US" sz="1000" b="1" dirty="0">
-                <a:latin typeface="Perpetua" pitchFamily="18" charset="0"/>
-              </a:rPr>
-              <a:t>S</a:t>
+              <a:t>Any </a:t>
             </a:r>
             <a:r>
               <a:rPr lang="en-US" sz="1000" b="1" dirty="0" smtClean="0">
                 <a:latin typeface="Perpetua" pitchFamily="18" charset="0"/>
               </a:rPr>
-              <a:t>wimming MB, </a:t>
-            </a:r>
-            <a:r>
-              <a:rPr lang="en-US" sz="1000" b="1" dirty="0">
-                <a:latin typeface="Perpetua" pitchFamily="18" charset="0"/>
-              </a:rPr>
-              <a:t>L</a:t>
-            </a:r>
-            <a:r>
-              <a:rPr lang="en-US" sz="1000" b="1" dirty="0" smtClean="0">
-                <a:latin typeface="Perpetua" pitchFamily="18" charset="0"/>
-              </a:rPr>
-              <a:t>ife </a:t>
-            </a:r>
-            <a:r>
-              <a:rPr lang="en-US" sz="1000" b="1" dirty="0">
-                <a:latin typeface="Perpetua" pitchFamily="18" charset="0"/>
-              </a:rPr>
-              <a:t>S</a:t>
-            </a:r>
-            <a:r>
-              <a:rPr lang="en-US" sz="1000" b="1" dirty="0" smtClean="0">
-                <a:latin typeface="Perpetua" pitchFamily="18" charset="0"/>
-              </a:rPr>
-              <a:t>aving M</a:t>
-            </a:r>
-            <a:r>
-              <a:rPr lang="en-US" sz="1000" b="1" dirty="0">
-                <a:latin typeface="Perpetua" pitchFamily="18" charset="0"/>
-              </a:rPr>
-              <a:t>B</a:t>
-            </a:r>
-            <a:r>
-              <a:rPr lang="en-US" sz="1000" b="1" dirty="0" smtClean="0">
-                <a:latin typeface="Perpetua" pitchFamily="18" charset="0"/>
-              </a:rPr>
-              <a:t>, </a:t>
-            </a:r>
-            <a:r>
-              <a:rPr lang="en-US" sz="1000" b="1" dirty="0">
-                <a:latin typeface="Perpetua" pitchFamily="18" charset="0"/>
-              </a:rPr>
-              <a:t>S</a:t>
-            </a:r>
-            <a:r>
-              <a:rPr lang="en-US" sz="1000" b="1" dirty="0" smtClean="0">
-                <a:latin typeface="Perpetua" pitchFamily="18" charset="0"/>
-              </a:rPr>
-              <a:t>cout swim )</a:t>
+              <a:t>parent / scout issues – we want feedback !!!!!</a:t>
             </a:r>
           </a:p>
           <a:p>
@@ -4419,17 +4272,20 @@
               <a:rPr lang="en-US" sz="1000" b="1" dirty="0" smtClean="0">
                 <a:latin typeface="Perpetua" pitchFamily="18" charset="0"/>
               </a:rPr>
-              <a:t> Any parent / scout issues – we want feedback !!!!</a:t>
+              <a:t> Thanks </a:t>
+            </a:r>
+            <a:r>
+              <a:rPr lang="en-US" sz="1000" b="1" dirty="0" err="1" smtClean="0">
+                <a:latin typeface="Perpetua" pitchFamily="18" charset="0"/>
+              </a:rPr>
+              <a:t>Mukund</a:t>
             </a:r>
             <a:r>
               <a:rPr lang="en-US" sz="1000" b="1" dirty="0" smtClean="0">
                 <a:latin typeface="Perpetua" pitchFamily="18" charset="0"/>
               </a:rPr>
-              <a:t>!</a:t>
-            </a:r>
-            <a:endParaRPr lang="en-US" sz="1000" b="1" dirty="0" smtClean="0">
-              <a:latin typeface="Perpetua" pitchFamily="18" charset="0"/>
-            </a:endParaRPr>
+              <a:t> for agreeing to stay as leader for the entire week for summer camp. </a:t>
+            </a:r>
           </a:p>
           <a:p>
             <a:pPr>
@@ -4440,19 +4296,25 @@
               <a:rPr lang="en-US" sz="1000" b="1" dirty="0">
                 <a:latin typeface="Perpetua" pitchFamily="18" charset="0"/>
               </a:rPr>
-              <a:t> Need ASMs for summer camp week </a:t>
+              <a:t> </a:t>
             </a:r>
             <a:r>
               <a:rPr lang="en-US" sz="1000" b="1" dirty="0" smtClean="0">
                 <a:latin typeface="Perpetua" pitchFamily="18" charset="0"/>
               </a:rPr>
-              <a:t>– Thanks </a:t>
+              <a:t>Please contact Eric </a:t>
             </a:r>
             <a:r>
               <a:rPr lang="en-US" sz="1000" b="1" dirty="0" err="1" smtClean="0">
                 <a:latin typeface="Perpetua" pitchFamily="18" charset="0"/>
               </a:rPr>
-              <a:t>Mukund</a:t>
+              <a:t>Wilford</a:t>
+            </a:r>
+            <a:r>
+              <a:rPr lang="en-US" sz="1000" b="1" dirty="0" smtClean="0">
+                <a:latin typeface="Perpetua" pitchFamily="18" charset="0"/>
+              </a:rPr>
+              <a:t> if you’d like to spend a few days at camp this July!</a:t>
             </a:r>
             <a:endParaRPr lang="en-US" sz="1000" b="1" dirty="0" smtClean="0">
               <a:latin typeface="Perpetua" pitchFamily="18" charset="0"/>
@@ -4473,8 +4335,29 @@
               <a:rPr lang="en-US" sz="1000" b="1" dirty="0" smtClean="0">
                 <a:latin typeface="Perpetua" pitchFamily="18" charset="0"/>
               </a:rPr>
-              <a:t>Still looking for scout leader</a:t>
-            </a:r>
+              <a:t>Hi Sierra meeting July 2</a:t>
+            </a:r>
+            <a:r>
+              <a:rPr lang="en-US" sz="1000" b="1" baseline="30000" dirty="0" smtClean="0">
+                <a:latin typeface="Perpetua" pitchFamily="18" charset="0"/>
+              </a:rPr>
+              <a:t>nd</a:t>
+            </a:r>
+            <a:r>
+              <a:rPr lang="en-US" sz="1000" b="1" dirty="0" smtClean="0">
+                <a:latin typeface="Perpetua" pitchFamily="18" charset="0"/>
+              </a:rPr>
+              <a:t> (Tuesday) – no troop meeting on July 4</a:t>
+            </a:r>
+            <a:r>
+              <a:rPr lang="en-US" sz="1000" b="1" baseline="30000" dirty="0" smtClean="0">
+                <a:latin typeface="Perpetua" pitchFamily="18" charset="0"/>
+              </a:rPr>
+              <a:t>th</a:t>
+            </a:r>
+            <a:endParaRPr lang="en-US" sz="1000" b="1" dirty="0" smtClean="0">
+              <a:latin typeface="Perpetua" pitchFamily="18" charset="0"/>
+            </a:endParaRPr>
           </a:p>
           <a:p>
             <a:pPr>
@@ -4491,7 +4374,37 @@
               <a:rPr lang="en-US" sz="1000" b="1" dirty="0" smtClean="0">
                 <a:latin typeface="Perpetua" pitchFamily="18" charset="0"/>
               </a:rPr>
-              <a:t>Hi Sierra meeting July 2</a:t>
+              <a:t>Scouts planning to take </a:t>
+            </a:r>
+            <a:r>
+              <a:rPr lang="en-US" sz="1000" b="1" dirty="0" err="1" smtClean="0">
+                <a:latin typeface="Perpetua" pitchFamily="18" charset="0"/>
+              </a:rPr>
+              <a:t>ePrep</a:t>
+            </a:r>
+            <a:r>
+              <a:rPr lang="en-US" sz="1000" b="1" dirty="0" smtClean="0">
+                <a:latin typeface="Perpetua" pitchFamily="18" charset="0"/>
+              </a:rPr>
+              <a:t> @ camp can complete their Troop Mobilization w/ Mr. Davidson in early September</a:t>
+            </a:r>
+          </a:p>
+          <a:p>
+            <a:pPr>
+              <a:buFont typeface="Wingdings" pitchFamily="2" charset="2"/>
+              <a:buChar char="Ø"/>
+            </a:pPr>
+            <a:r>
+              <a:rPr lang="en-US" sz="1000" b="1" dirty="0">
+                <a:latin typeface="Perpetua" pitchFamily="18" charset="0"/>
+              </a:rPr>
+              <a:t> </a:t>
+            </a:r>
+            <a:r>
+              <a:rPr lang="en-US" sz="1000" b="1" dirty="0" smtClean="0">
+                <a:latin typeface="Perpetua" pitchFamily="18" charset="0"/>
+              </a:rPr>
+              <a:t>Scouts planning to take First Aid @ camp can contact Mr. Davidson to get their rank (Tenderfoot, 2</a:t>
             </a:r>
             <a:r>
               <a:rPr lang="en-US" sz="1000" b="1" baseline="30000" dirty="0" smtClean="0">
@@ -4503,46 +4416,32 @@
               <a:rPr lang="en-US" sz="1000" b="1" dirty="0" smtClean="0">
                 <a:latin typeface="Perpetua" pitchFamily="18" charset="0"/>
               </a:rPr>
-              <a:t> (Tuesday) – no troop meeting on July 4</a:t>
+              <a:t> Class &amp; 1</a:t>
             </a:r>
             <a:r>
               <a:rPr lang="en-US" sz="1000" b="1" baseline="30000" dirty="0" smtClean="0">
                 <a:latin typeface="Perpetua" pitchFamily="18" charset="0"/>
               </a:rPr>
-              <a:t>th</a:t>
-            </a:r>
-            <a:endParaRPr lang="en-US" sz="1000" b="1" dirty="0" smtClean="0">
-              <a:latin typeface="Perpetua" pitchFamily="18" charset="0"/>
-            </a:endParaRPr>
-          </a:p>
-          <a:p>
-            <a:pPr>
-              <a:buFont typeface="Wingdings" pitchFamily="2" charset="2"/>
-              <a:buChar char="Ø"/>
-            </a:pPr>
-            <a:r>
-              <a:rPr lang="en-US" sz="1000" b="1" dirty="0">
+              <a:t>st</a:t>
+            </a:r>
+            <a:r>
+              <a:rPr lang="en-US" sz="1000" b="1" dirty="0" smtClean="0">
+                <a:latin typeface="Perpetua" pitchFamily="18" charset="0"/>
+              </a:rPr>
+              <a:t> Class) prerequisites done </a:t>
+            </a:r>
+            <a:r>
+              <a:rPr lang="en-US" sz="1000" b="1" dirty="0" smtClean="0">
+                <a:latin typeface="Perpetua" pitchFamily="18" charset="0"/>
+                <a:sym typeface="Wingdings"/>
+              </a:rPr>
+              <a:t> </a:t>
+            </a:r>
+            <a:r>
+              <a:rPr lang="en-US" sz="1000" b="1" dirty="0" smtClean="0">
                 <a:latin typeface="Perpetua" pitchFamily="18" charset="0"/>
               </a:rPr>
               <a:t> </a:t>
-            </a:r>
-            <a:r>
-              <a:rPr lang="en-US" sz="1000" b="1" dirty="0" err="1" smtClean="0">
-                <a:latin typeface="Perpetua" pitchFamily="18" charset="0"/>
-              </a:rPr>
-              <a:t>ePrep</a:t>
-            </a:r>
-            <a:r>
-              <a:rPr lang="en-US" sz="1000" b="1" dirty="0" smtClean="0">
-                <a:latin typeface="Perpetua" pitchFamily="18" charset="0"/>
-              </a:rPr>
-              <a:t> - &gt; email scouts ; First Aid – work w/ Alex to get the pre-</a:t>
-            </a:r>
-            <a:r>
-              <a:rPr lang="en-US" sz="1000" b="1" smtClean="0">
-                <a:latin typeface="Perpetua" pitchFamily="18" charset="0"/>
-              </a:rPr>
-              <a:t>reqs</a:t>
             </a:r>
             <a:endParaRPr lang="en-US" sz="1000" b="1" dirty="0" smtClean="0">
               <a:latin typeface="Perpetua" pitchFamily="18" charset="0"/>
@@ -4688,19 +4587,19 @@
                 <a:rPr lang="en-US" sz="1000" b="1" dirty="0" smtClean="0">
                   <a:latin typeface="Perpetua" pitchFamily="18" charset="0"/>
                 </a:rPr>
-                <a:t> </a:t>
+                <a:t>  Transition Planning - New Scoutmaster – </a:t>
               </a:r>
               <a:r>
                 <a:rPr lang="en-US" sz="1000" b="1" dirty="0" smtClean="0">
                   <a:latin typeface="Perpetua" pitchFamily="18" charset="0"/>
                 </a:rPr>
-                <a:t> </a:t>
+                <a:t>next </a:t>
               </a:r>
               <a:r>
                 <a:rPr lang="en-US" sz="1000" b="1" dirty="0" smtClean="0">
                   <a:latin typeface="Perpetua" pitchFamily="18" charset="0"/>
                 </a:rPr>
-                <a:t>Transition Planning - New Scoutmaster – next 12 months, New Committee Chair – next 12 months</a:t>
+                <a:t>12 months, New Committee Chair – next 12 months</a:t>
               </a:r>
             </a:p>
             <a:p>
@@ -4736,13 +4635,19 @@
                 <a:rPr lang="en-US" sz="1000" b="1" dirty="0" smtClean="0">
                   <a:latin typeface="Perpetua" pitchFamily="18" charset="0"/>
                 </a:rPr>
-                <a:t> for stepping up to take on the FOS </a:t>
+                <a:t> for stepping up to take on the FOS role ($2800 – 33% of families have participated); </a:t>
               </a:r>
               <a:r>
                 <a:rPr lang="en-US" sz="1000" b="1" dirty="0" smtClean="0">
                   <a:latin typeface="Perpetua" pitchFamily="18" charset="0"/>
                 </a:rPr>
-                <a:t>role ($2800 – 33% of families have participated); need to notify others! </a:t>
+                <a:t>please need </a:t>
+              </a:r>
+              <a:r>
+                <a:rPr lang="en-US" sz="1000" b="1" dirty="0" smtClean="0">
+                  <a:latin typeface="Perpetua" pitchFamily="18" charset="0"/>
+                </a:rPr>
+                <a:t>to notify others! </a:t>
               </a:r>
               <a:r>
                 <a:rPr lang="en-US" sz="1000" b="1" dirty="0" smtClean="0">
@@ -4764,8 +4669,29 @@
                 <a:rPr lang="en-US" sz="1000" b="1" dirty="0" smtClean="0">
                   <a:latin typeface="Perpetua" pitchFamily="18" charset="0"/>
                 </a:rPr>
-                <a:t> Give away gear this week!</a:t>
+                <a:t> </a:t>
               </a:r>
+              <a:r>
+                <a:rPr lang="en-US" sz="1000" b="1" dirty="0" smtClean="0">
+                  <a:latin typeface="Perpetua" pitchFamily="18" charset="0"/>
+                </a:rPr>
+                <a:t>Good </a:t>
+              </a:r>
+              <a:r>
+                <a:rPr lang="en-US" sz="1000" b="1" dirty="0" smtClean="0">
+                  <a:latin typeface="Perpetua" pitchFamily="18" charset="0"/>
+                </a:rPr>
+                <a:t>planning meeting, will publish TAG w/ assignments (2 adult leaders and ASM</a:t>
+              </a:r>
+              <a:r>
+                <a:rPr lang="en-US" sz="1000" b="1" dirty="0" smtClean="0">
+                  <a:latin typeface="Perpetua" pitchFamily="18" charset="0"/>
+                </a:rPr>
+                <a:t>) and opportunities to help this weekend!</a:t>
+              </a:r>
+              <a:endParaRPr lang="en-US" sz="1000" b="1" dirty="0" smtClean="0">
+                <a:latin typeface="Perpetua" pitchFamily="18" charset="0"/>
+              </a:endParaRPr>
             </a:p>
             <a:p>
               <a:pPr>
@@ -4780,36 +4706,6 @@
               </a:r>
               <a:r>
                 <a:rPr lang="en-US" sz="1000" b="1" dirty="0" smtClean="0">
-                  <a:latin typeface="Perpetua" pitchFamily="18" charset="0"/>
-                </a:rPr>
-                <a:t>Good planning meeting, will publish TAG w/ assignments (2 adult leaders and ASM)</a:t>
-              </a:r>
-            </a:p>
-            <a:p>
-              <a:pPr>
-                <a:buFont typeface="Wingdings" pitchFamily="2" charset="2"/>
-                <a:buChar char="Ø"/>
-              </a:pPr>
-              <a:r>
-                <a:rPr lang="en-US" sz="1000" b="1" dirty="0">
-                  <a:latin typeface="Perpetua" pitchFamily="18" charset="0"/>
-                </a:rPr>
-                <a:t> </a:t>
-              </a:r>
-              <a:r>
-                <a:rPr lang="en-US" sz="1000" b="1" dirty="0" smtClean="0">
-                  <a:latin typeface="Perpetua" pitchFamily="18" charset="0"/>
-                </a:rPr>
-                <a:t>Need list to bring for Point Reyes … </a:t>
-              </a:r>
-            </a:p>
-            <a:p>
-              <a:pPr>
-                <a:buFont typeface="Wingdings" pitchFamily="2" charset="2"/>
-                <a:buChar char="Ø"/>
-              </a:pPr>
-              <a:r>
-                <a:rPr lang="en-US" sz="1000" b="1" dirty="0">
                   <a:latin typeface="Perpetua" pitchFamily="18" charset="0"/>
                 </a:rPr>
                 <a:t> </a:t>
@@ -4935,7 +4831,7 @@
         </p:nvGrpSpPr>
         <p:grpSpPr>
           <a:xfrm>
-            <a:off x="2362200" y="5476875"/>
+            <a:off x="32408" y="5476875"/>
             <a:ext cx="2228850" cy="1219200"/>
             <a:chOff x="209550" y="5638800"/>
             <a:chExt cx="2228850" cy="1066800"/>
@@ -5047,6 +4943,25 @@
               <a:endParaRPr lang="en-US" sz="1000" b="1" dirty="0" smtClean="0"/>
             </a:p>
             <a:p>
+              <a:r>
+                <a:rPr lang="en-US" sz="1000" b="1" dirty="0" smtClean="0"/>
+                <a:t>@ Camp Leader: </a:t>
+              </a:r>
+              <a:r>
+                <a:rPr lang="en-US" sz="1000" b="1" dirty="0" err="1" smtClean="0"/>
+                <a:t>Mukund</a:t>
+              </a:r>
+              <a:r>
+                <a:rPr lang="en-US" sz="1000" b="1" dirty="0" smtClean="0"/>
+                <a:t> </a:t>
+              </a:r>
+              <a:r>
+                <a:rPr lang="en-US" sz="1000" b="1" dirty="0" err="1" smtClean="0"/>
+                <a:t>Madhugiri</a:t>
+              </a:r>
+              <a:endParaRPr lang="en-US" sz="1000" b="1" dirty="0" smtClean="0"/>
+            </a:p>
+            <a:p>
               <a:pPr>
                 <a:buFont typeface="Wingdings" pitchFamily="2" charset="2"/>
                 <a:buChar char="Ø"/>
@@ -5067,7 +4982,7 @@
         </p:nvGrpSpPr>
         <p:grpSpPr>
           <a:xfrm>
-            <a:off x="4648200" y="5486400"/>
+            <a:off x="2328407" y="5486400"/>
             <a:ext cx="2209800" cy="1219200"/>
             <a:chOff x="152400" y="5638800"/>
             <a:chExt cx="2209800" cy="1066800"/>
@@ -5164,8 +5079,13 @@
             <a:p>
               <a:r>
                 <a:rPr lang="en-US" sz="1000" b="1" dirty="0" smtClean="0"/>
-                <a:t>Trek:  Rafting</a:t>
+                <a:t>Trek:  </a:t>
               </a:r>
+              <a:r>
+                <a:rPr lang="en-US" sz="1000" b="1" dirty="0" smtClean="0"/>
+                <a:t>Rafting / Camp  (Sacramento)</a:t>
+              </a:r>
+              <a:endParaRPr lang="en-US" sz="1000" b="1" dirty="0" smtClean="0"/>
             </a:p>
             <a:p>
               <a:r>
@@ -5173,16 +5093,16 @@
                 <a:t>Trek Leader: </a:t>
               </a:r>
               <a:r>
-                <a:rPr lang="en-US" sz="1000" b="1" dirty="0" err="1" smtClean="0"/>
-                <a:t>Pushpak</a:t>
+                <a:rPr lang="en-US" sz="1000" b="1" dirty="0" err="1"/>
+                <a:t>Shalabh</a:t>
               </a:r>
               <a:r>
-                <a:rPr lang="en-US" sz="1000" b="1" dirty="0" smtClean="0"/>
+                <a:rPr lang="en-US" sz="1000" b="1" dirty="0"/>
                 <a:t> </a:t>
               </a:r>
               <a:r>
-                <a:rPr lang="en-US" sz="1000" b="1" dirty="0" err="1" smtClean="0"/>
-                <a:t>Bapat</a:t>
+                <a:rPr lang="en-US" sz="1000" b="1" dirty="0" err="1"/>
+                <a:t>Goel</a:t>
               </a:r>
               <a:endParaRPr lang="en-US" sz="1000" b="1" dirty="0" smtClean="0"/>
             </a:p>
@@ -5201,13 +5121,13 @@
       </p:grpSp>
       <p:grpSp>
         <p:nvGrpSpPr>
-          <p:cNvPr id="45" name="Group 44"/>
+          <p:cNvPr id="41" name="Group 40"/>
           <p:cNvGrpSpPr/>
           <p:nvPr/>
         </p:nvGrpSpPr>
         <p:grpSpPr>
           <a:xfrm>
-            <a:off x="76200" y="5495925"/>
+            <a:off x="4605356" y="5486400"/>
             <a:ext cx="2228850" cy="1219200"/>
             <a:chOff x="209550" y="5638800"/>
             <a:chExt cx="2228850" cy="1066800"/>
@@ -5215,7 +5135,7 @@
         </p:grpSpPr>
         <p:sp>
           <p:nvSpPr>
-            <p:cNvPr id="46" name="Rounded Rectangle 45"/>
+            <p:cNvPr id="42" name="Rounded Rectangle 41"/>
             <p:cNvSpPr/>
             <p:nvPr/>
           </p:nvSpPr>
@@ -5253,14 +5173,14 @@
         </p:sp>
         <p:sp>
           <p:nvSpPr>
-            <p:cNvPr id="47" name="TextBox 46"/>
+            <p:cNvPr id="43" name="TextBox 42"/>
             <p:cNvSpPr txBox="1"/>
             <p:nvPr/>
           </p:nvSpPr>
           <p:spPr>
             <a:xfrm>
               <a:off x="581025" y="5647551"/>
-              <a:ext cx="1467068" cy="242374"/>
+              <a:ext cx="979755" cy="242374"/>
             </a:xfrm>
             <a:prstGeom prst="rect">
               <a:avLst/>
@@ -5275,21 +5195,21 @@
             <a:p>
               <a:r>
                 <a:rPr lang="en-US" sz="1200" b="1" dirty="0" smtClean="0"/>
-                <a:t>June 19 – 21 (W – F)</a:t>
+                <a:t>Sept. 21 - 22</a:t>
               </a:r>
             </a:p>
           </p:txBody>
         </p:sp>
         <p:sp>
           <p:nvSpPr>
-            <p:cNvPr id="48" name="TextBox 47"/>
+            <p:cNvPr id="44" name="TextBox 43"/>
             <p:cNvSpPr txBox="1"/>
             <p:nvPr/>
           </p:nvSpPr>
           <p:spPr>
             <a:xfrm>
-              <a:off x="209550" y="5855553"/>
-              <a:ext cx="2118619" cy="783372"/>
+              <a:off x="209550" y="5805487"/>
+              <a:ext cx="2111822" cy="900113"/>
             </a:xfrm>
             <a:prstGeom prst="rect">
               <a:avLst/>
@@ -5304,22 +5224,23 @@
             <a:p>
               <a:r>
                 <a:rPr lang="en-US" sz="1000" b="1" dirty="0" smtClean="0"/>
-                <a:t>Trek:  Point Reyes </a:t>
-              </a:r>
-              <a:r>
-                <a:rPr lang="en-US" sz="1000" b="1" dirty="0" err="1" smtClean="0"/>
-                <a:t>Natl</a:t>
-              </a:r>
-              <a:r>
-                <a:rPr lang="en-US" sz="1000" b="1" dirty="0" smtClean="0"/>
-                <a:t> Seashore</a:t>
+                <a:t>Trek: Pinnacles (car camping)</a:t>
               </a:r>
             </a:p>
             <a:p>
               <a:r>
                 <a:rPr lang="en-US" sz="1000" b="1" dirty="0" smtClean="0"/>
-                <a:t>Trek Leader: Rick Adolf (?)</a:t>
+                <a:t>Trek Leader: </a:t>
               </a:r>
+              <a:r>
+                <a:rPr lang="en-US" sz="1000" b="1" dirty="0" smtClean="0"/>
+                <a:t>Max </a:t>
+              </a:r>
+              <a:r>
+                <a:rPr lang="en-US" sz="1000" b="1" dirty="0" err="1" smtClean="0"/>
+                <a:t>Uyematsu</a:t>
+              </a:r>
+              <a:endParaRPr lang="en-US" sz="1000" b="1" dirty="0" smtClean="0"/>
             </a:p>
             <a:p>
               <a:pPr>
@@ -5328,8 +5249,13 @@
               </a:pPr>
               <a:r>
                 <a:rPr lang="en-US" sz="1000" dirty="0" smtClean="0"/>
-                <a:t> Night (moon) backpacking</a:t>
+                <a:t> </a:t>
               </a:r>
+              <a:r>
+                <a:rPr lang="en-US" sz="1000" dirty="0" smtClean="0"/>
+                <a:t>Day hike (no packs)</a:t>
+              </a:r>
+              <a:endParaRPr lang="en-US" sz="1000" dirty="0" smtClean="0"/>
             </a:p>
             <a:p>
               <a:pPr>
@@ -5337,22 +5263,27 @@
                 <a:buChar char="Ø"/>
               </a:pPr>
               <a:r>
+                <a:rPr lang="en-US" sz="1000" dirty="0"/>
+                <a:t> </a:t>
+              </a:r>
+              <a:r>
                 <a:rPr lang="en-US" sz="1000" dirty="0" smtClean="0"/>
-                <a:t>Reserved Wildcat group site (basically on the beach!!)</a:t>
+                <a:t> Car camping – great campout for new parents!</a:t>
               </a:r>
+              <a:endParaRPr lang="en-US" sz="1000" dirty="0" smtClean="0"/>
             </a:p>
           </p:txBody>
         </p:sp>
       </p:grpSp>
       <p:grpSp>
         <p:nvGrpSpPr>
-          <p:cNvPr id="50" name="Group 49"/>
+          <p:cNvPr id="58" name="Group 57"/>
           <p:cNvGrpSpPr/>
           <p:nvPr/>
         </p:nvGrpSpPr>
         <p:grpSpPr>
           <a:xfrm>
-            <a:off x="6858000" y="5486400"/>
+            <a:off x="6901356" y="5486400"/>
             <a:ext cx="2228850" cy="1219200"/>
             <a:chOff x="209550" y="5638800"/>
             <a:chExt cx="2228850" cy="1066800"/>
@@ -5360,7 +5291,7 @@
         </p:grpSpPr>
         <p:sp>
           <p:nvSpPr>
-            <p:cNvPr id="51" name="Rounded Rectangle 50"/>
+            <p:cNvPr id="59" name="Rounded Rectangle 58"/>
             <p:cNvSpPr/>
             <p:nvPr/>
           </p:nvSpPr>
@@ -5398,14 +5329,14 @@
         </p:sp>
         <p:sp>
           <p:nvSpPr>
-            <p:cNvPr id="52" name="TextBox 51"/>
+            <p:cNvPr id="60" name="TextBox 59"/>
             <p:cNvSpPr txBox="1"/>
             <p:nvPr/>
           </p:nvSpPr>
           <p:spPr>
             <a:xfrm>
               <a:off x="581025" y="5647551"/>
-              <a:ext cx="724928" cy="242374"/>
+              <a:ext cx="911052" cy="242374"/>
             </a:xfrm>
             <a:prstGeom prst="rect">
               <a:avLst/>
@@ -5420,938 +5351,39 @@
             <a:p>
               <a:r>
                 <a:rPr lang="en-US" sz="1200" b="1" dirty="0" smtClean="0"/>
-                <a:t>Sep</a:t>
+                <a:t>Oc</a:t>
               </a:r>
               <a:r>
                 <a:rPr lang="en-US" sz="1200" b="1" dirty="0" smtClean="0"/>
-                <a:t>  </a:t>
+                <a:t>t</a:t>
               </a:r>
               <a:r>
                 <a:rPr lang="en-US" sz="1200" b="1" dirty="0" smtClean="0"/>
-                <a:t>- 11</a:t>
+                <a:t>. </a:t>
               </a:r>
+              <a:r>
+                <a:rPr lang="en-US" sz="1200" b="1" dirty="0" smtClean="0"/>
+                <a:t>19</a:t>
+              </a:r>
+              <a:r>
+                <a:rPr lang="en-US" sz="1200" b="1" dirty="0" smtClean="0"/>
+                <a:t> </a:t>
+              </a:r>
+              <a:r>
+                <a:rPr lang="en-US" sz="1200" b="1" dirty="0" smtClean="0"/>
+                <a:t>- </a:t>
+              </a:r>
+              <a:r>
+                <a:rPr lang="en-US" sz="1200" b="1" dirty="0" smtClean="0"/>
+                <a:t>20</a:t>
+              </a:r>
+              <a:endParaRPr lang="en-US" sz="1200" b="1" dirty="0" smtClean="0"/>
             </a:p>
           </p:txBody>
         </p:sp>
         <p:sp>
           <p:nvSpPr>
-            <p:cNvPr id="53" name="TextBox 52"/>
-            <p:cNvSpPr txBox="1"/>
-            <p:nvPr/>
-          </p:nvSpPr>
-          <p:spPr>
-            <a:xfrm>
-              <a:off x="209550" y="5855553"/>
-              <a:ext cx="2118619" cy="783372"/>
-            </a:xfrm>
-            <a:prstGeom prst="rect">
-              <a:avLst/>
-            </a:prstGeom>
-            <a:noFill/>
-          </p:spPr>
-          <p:txBody>
-            <a:bodyPr wrap="square" rtlCol="0">
-              <a:noAutofit/>
-            </a:bodyPr>
-            <a:lstStyle/>
-            <a:p>
-              <a:r>
-                <a:rPr lang="en-US" sz="1000" b="1" dirty="0" smtClean="0"/>
-                <a:t>Trek</a:t>
-              </a:r>
-              <a:r>
-                <a:rPr lang="en-US" sz="1000" b="1" dirty="0" smtClean="0"/>
-                <a:t>: Pinnacles</a:t>
-              </a:r>
-              <a:endParaRPr lang="en-US" sz="1000" b="1" dirty="0" smtClean="0"/>
-            </a:p>
-            <a:p>
-              <a:r>
-                <a:rPr lang="en-US" sz="1000" b="1" dirty="0" smtClean="0"/>
-                <a:t>Trek Leader</a:t>
-              </a:r>
-              <a:r>
-                <a:rPr lang="en-US" sz="1000" b="1" dirty="0" smtClean="0"/>
-                <a:t>:</a:t>
-              </a:r>
-              <a:endParaRPr lang="en-US" sz="1000" b="1" dirty="0" smtClean="0"/>
-            </a:p>
-            <a:p>
-              <a:pPr>
-                <a:buFont typeface="Wingdings" pitchFamily="2" charset="2"/>
-                <a:buChar char="Ø"/>
-              </a:pPr>
-              <a:r>
-                <a:rPr lang="en-US" sz="1000" dirty="0" smtClean="0"/>
-                <a:t> </a:t>
-              </a:r>
-            </a:p>
-          </p:txBody>
-        </p:sp>
-      </p:grpSp>
-    </p:spTree>
-  </p:cSld>
-  <p:clrMapOvr>
-    <a:masterClrMapping/>
-  </p:clrMapOvr>
-</p:sld>
-</file>
-
-<file path=ppt/slides/slide2.xml><?xml version="1.0" encoding="utf-8"?>
-<p:sld xmlns:a="http://schemas.openxmlformats.org/drawingml/2006/main" xmlns:r="http://schemas.openxmlformats.org/officeDocument/2006/relationships" xmlns:p="http://schemas.openxmlformats.org/presentationml/2006/main">
-  <p:cSld>
-    <p:spTree>
-      <p:nvGrpSpPr>
-        <p:cNvPr id="1" name=""/>
-        <p:cNvGrpSpPr/>
-        <p:nvPr/>
-      </p:nvGrpSpPr>
-      <p:grpSpPr>
-        <a:xfrm>
-          <a:off x="0" y="0"/>
-          <a:ext cx="0" cy="0"/>
-          <a:chOff x="0" y="0"/>
-          <a:chExt cx="0" cy="0"/>
-        </a:xfrm>
-      </p:grpSpPr>
-      <p:pic>
-        <p:nvPicPr>
-          <p:cNvPr id="4" name="WordPictureWatermark3" descr="logo_sm"/>
-          <p:cNvPicPr>
-            <a:picLocks noChangeAspect="1" noChangeArrowheads="1"/>
-          </p:cNvPicPr>
-          <p:nvPr/>
-        </p:nvPicPr>
-        <p:blipFill>
-          <a:blip r:embed="rId3" cstate="print"/>
-          <a:srcRect/>
-          <a:stretch>
-            <a:fillRect/>
-          </a:stretch>
-        </p:blipFill>
-        <p:spPr bwMode="auto">
-          <a:xfrm>
-            <a:off x="228600" y="152400"/>
-            <a:ext cx="762000" cy="762000"/>
-          </a:xfrm>
-          <a:prstGeom prst="rect">
-            <a:avLst/>
-          </a:prstGeom>
-          <a:noFill/>
-          <a:ln w="9525">
-            <a:noFill/>
-            <a:miter lim="800000"/>
-            <a:headEnd/>
-            <a:tailEnd/>
-          </a:ln>
-        </p:spPr>
-      </p:pic>
-      <p:sp>
-        <p:nvSpPr>
-          <p:cNvPr id="5" name="TextBox 4"/>
-          <p:cNvSpPr txBox="1"/>
-          <p:nvPr/>
-        </p:nvSpPr>
-        <p:spPr>
-          <a:xfrm>
-            <a:off x="2081906" y="152400"/>
-            <a:ext cx="5981738" cy="584776"/>
-          </a:xfrm>
-          <a:prstGeom prst="rect">
-            <a:avLst/>
-          </a:prstGeom>
-          <a:noFill/>
-        </p:spPr>
-        <p:txBody>
-          <a:bodyPr wrap="none" rtlCol="0">
-            <a:spAutoFit/>
-          </a:bodyPr>
-          <a:lstStyle/>
-          <a:p>
-            <a:pPr algn="ctr"/>
-            <a:r>
-              <a:rPr lang="en-US" dirty="0" smtClean="0"/>
-              <a:t>Troop 457 Committee Meeting Notes Summary : April 9, 2013</a:t>
-            </a:r>
-          </a:p>
-          <a:p>
-            <a:pPr algn="ctr"/>
-            <a:r>
-              <a:rPr lang="en-US" sz="1400" dirty="0" smtClean="0">
-                <a:solidFill>
-                  <a:schemeClr val="accent2">
-                    <a:lumMod val="75000"/>
-                  </a:schemeClr>
-                </a:solidFill>
-              </a:rPr>
-              <a:t>( additional other topics )</a:t>
-            </a:r>
-            <a:endParaRPr lang="en-US" sz="1400" dirty="0">
-              <a:solidFill>
-                <a:schemeClr val="accent2">
-                  <a:lumMod val="75000"/>
-                </a:schemeClr>
-              </a:solidFill>
-            </a:endParaRPr>
-          </a:p>
-        </p:txBody>
-      </p:sp>
-      <p:grpSp>
-        <p:nvGrpSpPr>
-          <p:cNvPr id="26" name="Group 25"/>
-          <p:cNvGrpSpPr/>
-          <p:nvPr/>
-        </p:nvGrpSpPr>
-        <p:grpSpPr>
-          <a:xfrm>
-            <a:off x="152400" y="1219200"/>
-            <a:ext cx="8848725" cy="3581400"/>
-            <a:chOff x="152400" y="3810000"/>
-            <a:chExt cx="8848725" cy="1143000"/>
-          </a:xfrm>
-        </p:grpSpPr>
-        <p:sp>
-          <p:nvSpPr>
-            <p:cNvPr id="22" name="Rounded Rectangle 21"/>
-            <p:cNvSpPr/>
-            <p:nvPr/>
-          </p:nvSpPr>
-          <p:spPr>
-            <a:xfrm>
-              <a:off x="152400" y="3810000"/>
-              <a:ext cx="8848725" cy="1143000"/>
-            </a:xfrm>
-            <a:prstGeom prst="roundRect">
-              <a:avLst/>
-            </a:prstGeom>
-            <a:ln>
-              <a:solidFill>
-                <a:schemeClr val="accent3">
-                  <a:lumMod val="75000"/>
-                </a:schemeClr>
-              </a:solidFill>
-            </a:ln>
-          </p:spPr>
-          <p:style>
-            <a:lnRef idx="1">
-              <a:schemeClr val="accent3"/>
-            </a:lnRef>
-            <a:fillRef idx="2">
-              <a:schemeClr val="accent3"/>
-            </a:fillRef>
-            <a:effectRef idx="1">
-              <a:schemeClr val="accent3"/>
-            </a:effectRef>
-            <a:fontRef idx="minor">
-              <a:schemeClr val="dk1"/>
-            </a:fontRef>
-          </p:style>
-          <p:txBody>
-            <a:bodyPr rtlCol="0" anchor="ctr"/>
-            <a:lstStyle/>
-            <a:p>
-              <a:pPr algn="ctr"/>
-              <a:endParaRPr lang="en-US"/>
-            </a:p>
-          </p:txBody>
-        </p:sp>
-        <p:sp>
-          <p:nvSpPr>
-            <p:cNvPr id="23" name="TextBox 22"/>
-            <p:cNvSpPr txBox="1"/>
-            <p:nvPr/>
-          </p:nvSpPr>
-          <p:spPr>
-            <a:xfrm>
-              <a:off x="552451" y="3810000"/>
-              <a:ext cx="1446505" cy="276999"/>
-            </a:xfrm>
-            <a:prstGeom prst="rect">
-              <a:avLst/>
-            </a:prstGeom>
-            <a:noFill/>
-          </p:spPr>
-          <p:txBody>
-            <a:bodyPr wrap="none" rtlCol="0">
-              <a:spAutoFit/>
-            </a:bodyPr>
-            <a:lstStyle/>
-            <a:p>
-              <a:r>
-                <a:rPr lang="en-US" sz="1200" b="1" dirty="0" smtClean="0">
-                  <a:solidFill>
-                    <a:schemeClr val="accent4">
-                      <a:lumMod val="50000"/>
-                    </a:schemeClr>
-                  </a:solidFill>
-                  <a:latin typeface="Perpetua" pitchFamily="18" charset="0"/>
-                </a:rPr>
-                <a:t>Other Topics (</a:t>
-              </a:r>
-              <a:r>
-                <a:rPr lang="en-US" sz="1200" b="1" dirty="0" err="1" smtClean="0">
-                  <a:solidFill>
-                    <a:schemeClr val="accent4">
-                      <a:lumMod val="50000"/>
-                    </a:schemeClr>
-                  </a:solidFill>
-                  <a:latin typeface="Perpetua" pitchFamily="18" charset="0"/>
-                </a:rPr>
-                <a:t>cont</a:t>
-              </a:r>
-              <a:r>
-                <a:rPr lang="en-US" sz="1200" b="1" dirty="0" smtClean="0">
-                  <a:solidFill>
-                    <a:schemeClr val="accent4">
-                      <a:lumMod val="50000"/>
-                    </a:schemeClr>
-                  </a:solidFill>
-                  <a:latin typeface="Perpetua" pitchFamily="18" charset="0"/>
-                </a:rPr>
-                <a:t>)</a:t>
-              </a:r>
-              <a:endParaRPr lang="en-US" sz="1200" b="1" dirty="0">
-                <a:solidFill>
-                  <a:schemeClr val="accent4">
-                    <a:lumMod val="50000"/>
-                  </a:schemeClr>
-                </a:solidFill>
-                <a:latin typeface="Perpetua" pitchFamily="18" charset="0"/>
-              </a:endParaRPr>
-            </a:p>
-          </p:txBody>
-        </p:sp>
-        <p:sp>
-          <p:nvSpPr>
-            <p:cNvPr id="24" name="TextBox 23"/>
-            <p:cNvSpPr txBox="1"/>
-            <p:nvPr/>
-          </p:nvSpPr>
-          <p:spPr>
-            <a:xfrm>
-              <a:off x="228601" y="3969604"/>
-              <a:ext cx="8720657" cy="943983"/>
-            </a:xfrm>
-            <a:prstGeom prst="rect">
-              <a:avLst/>
-            </a:prstGeom>
-            <a:noFill/>
-          </p:spPr>
-          <p:txBody>
-            <a:bodyPr wrap="square" rtlCol="0">
-              <a:noAutofit/>
-            </a:bodyPr>
-            <a:lstStyle/>
-            <a:p>
-              <a:pPr>
-                <a:buFont typeface="Wingdings" pitchFamily="2" charset="2"/>
-                <a:buChar char="Ø"/>
-              </a:pPr>
-              <a:r>
-                <a:rPr lang="en-US" sz="1000" b="1" dirty="0" smtClean="0">
-                  <a:latin typeface="Perpetua" pitchFamily="18" charset="0"/>
-                </a:rPr>
-                <a:t>ASM expectations – participate in 3 to 4 campouts per year (possibly advancement oriented or camp support oriented)</a:t>
-              </a:r>
-            </a:p>
-            <a:p>
-              <a:pPr>
-                <a:buFont typeface="Wingdings" pitchFamily="2" charset="2"/>
-                <a:buChar char="Ø"/>
-              </a:pPr>
-              <a:endParaRPr lang="en-US" sz="1000" b="1" dirty="0">
-                <a:latin typeface="Perpetua" pitchFamily="18" charset="0"/>
-              </a:endParaRPr>
-            </a:p>
-            <a:p>
-              <a:pPr>
-                <a:buFont typeface="Wingdings" pitchFamily="2" charset="2"/>
-                <a:buChar char="Ø"/>
-              </a:pPr>
-              <a:r>
-                <a:rPr lang="en-US" sz="1000" b="1" dirty="0" smtClean="0">
-                  <a:latin typeface="Perpetua" pitchFamily="18" charset="0"/>
-                </a:rPr>
-                <a:t> Next Year … get the group campsite @ Mt. Diablo </a:t>
-              </a:r>
-            </a:p>
-            <a:p>
-              <a:pPr>
-                <a:buFont typeface="Wingdings" pitchFamily="2" charset="2"/>
-                <a:buChar char="Ø"/>
-              </a:pPr>
-              <a:r>
-                <a:rPr lang="en-US" sz="1000" b="1" dirty="0">
-                  <a:latin typeface="Perpetua" pitchFamily="18" charset="0"/>
-                </a:rPr>
-                <a:t> </a:t>
-              </a:r>
-              <a:r>
-                <a:rPr lang="en-US" sz="1000" b="1" dirty="0" smtClean="0">
-                  <a:latin typeface="Perpetua" pitchFamily="18" charset="0"/>
-                </a:rPr>
-                <a:t>Point Reyes – need to get logistics done (car shuttle, who’s going leaders/scouts)</a:t>
-              </a:r>
-            </a:p>
-            <a:p>
-              <a:pPr>
-                <a:buFont typeface="Wingdings" pitchFamily="2" charset="2"/>
-                <a:buChar char="Ø"/>
-              </a:pPr>
-              <a:r>
-                <a:rPr lang="en-US" sz="1000" b="1" dirty="0" smtClean="0">
-                  <a:latin typeface="Perpetua" pitchFamily="18" charset="0"/>
-                </a:rPr>
-                <a:t> Summer Camp – need some more adults, most MBs are good, looking at 2 provisional scouts (from T 466)</a:t>
-              </a:r>
-            </a:p>
-            <a:p>
-              <a:pPr>
-                <a:buFont typeface="Wingdings" pitchFamily="2" charset="2"/>
-                <a:buChar char="Ø"/>
-              </a:pPr>
-              <a:r>
-                <a:rPr lang="en-US" sz="1000" b="1" dirty="0">
-                  <a:latin typeface="Perpetua" pitchFamily="18" charset="0"/>
-                </a:rPr>
-                <a:t> </a:t>
-              </a:r>
-              <a:r>
-                <a:rPr lang="en-US" sz="1000" b="1" dirty="0" smtClean="0">
-                  <a:latin typeface="Perpetua" pitchFamily="18" charset="0"/>
-                </a:rPr>
-                <a:t>Sea Base (on track) in July, Rafting in August (no age restrictions : floating not rafting) – we need certified water safety people </a:t>
-              </a:r>
-            </a:p>
-            <a:p>
-              <a:pPr>
-                <a:buFont typeface="Wingdings" pitchFamily="2" charset="2"/>
-                <a:buChar char="Ø"/>
-              </a:pPr>
-              <a:r>
-                <a:rPr lang="en-US" sz="1000" b="1" dirty="0">
-                  <a:latin typeface="Perpetua" pitchFamily="18" charset="0"/>
-                </a:rPr>
-                <a:t> </a:t>
-              </a:r>
-              <a:r>
-                <a:rPr lang="en-US" sz="1000" b="1" dirty="0" smtClean="0">
-                  <a:latin typeface="Perpetua" pitchFamily="18" charset="0"/>
-                </a:rPr>
-                <a:t>16 </a:t>
-              </a:r>
-              <a:r>
-                <a:rPr lang="en-US" sz="1000" b="1" dirty="0" err="1" smtClean="0">
-                  <a:latin typeface="Perpetua" pitchFamily="18" charset="0"/>
-                </a:rPr>
-                <a:t>yr</a:t>
-              </a:r>
-              <a:r>
-                <a:rPr lang="en-US" sz="1000" b="1" dirty="0" smtClean="0">
-                  <a:latin typeface="Perpetua" pitchFamily="18" charset="0"/>
-                </a:rPr>
-                <a:t> olds will move into the Sr. Patrol ; need trek leaders from this group</a:t>
-              </a:r>
-            </a:p>
-            <a:p>
-              <a:pPr>
-                <a:buFont typeface="Wingdings" pitchFamily="2" charset="2"/>
-                <a:buChar char="Ø"/>
-              </a:pPr>
-              <a:r>
-                <a:rPr lang="en-US" sz="1000" b="1" dirty="0">
-                  <a:latin typeface="Perpetua" pitchFamily="18" charset="0"/>
-                </a:rPr>
-                <a:t> </a:t>
-              </a:r>
-              <a:r>
-                <a:rPr lang="en-US" sz="1000" b="1" dirty="0" smtClean="0">
-                  <a:latin typeface="Perpetua" pitchFamily="18" charset="0"/>
-                </a:rPr>
-                <a:t>Elections in June (</a:t>
-              </a:r>
-              <a:r>
-                <a:rPr lang="en-US" sz="1000" b="1" dirty="0" err="1" smtClean="0">
-                  <a:latin typeface="Perpetua" pitchFamily="18" charset="0"/>
-                </a:rPr>
-                <a:t>Sr</a:t>
-              </a:r>
-              <a:r>
-                <a:rPr lang="en-US" sz="1000" b="1" dirty="0" smtClean="0">
-                  <a:latin typeface="Perpetua" pitchFamily="18" charset="0"/>
-                </a:rPr>
-                <a:t> Scouts will be assigned trek outings – 6 months in advance)</a:t>
-              </a:r>
-            </a:p>
-            <a:p>
-              <a:pPr lvl="1">
-                <a:buFont typeface="Wingdings" pitchFamily="2" charset="2"/>
-                <a:buChar char="Ø"/>
-              </a:pPr>
-              <a:r>
-                <a:rPr lang="en-US" sz="1000" b="1" dirty="0">
-                  <a:latin typeface="Perpetua" pitchFamily="18" charset="0"/>
-                </a:rPr>
-                <a:t> </a:t>
-              </a:r>
-              <a:r>
-                <a:rPr lang="en-US" sz="1000" b="1" dirty="0" smtClean="0">
-                  <a:latin typeface="Perpetua" pitchFamily="18" charset="0"/>
-                </a:rPr>
-                <a:t>Need to id SPL / ASPL (Ian / Cole)</a:t>
-              </a:r>
-            </a:p>
-            <a:p>
-              <a:pPr lvl="1">
-                <a:buFont typeface="Wingdings" pitchFamily="2" charset="2"/>
-                <a:buChar char="Ø"/>
-              </a:pPr>
-              <a:r>
-                <a:rPr lang="en-US" sz="1000" b="1" dirty="0">
-                  <a:latin typeface="Perpetua" pitchFamily="18" charset="0"/>
-                </a:rPr>
-                <a:t> </a:t>
-              </a:r>
-              <a:r>
-                <a:rPr lang="en-US" sz="1000" b="1" dirty="0" smtClean="0">
-                  <a:latin typeface="Perpetua" pitchFamily="18" charset="0"/>
-                </a:rPr>
-                <a:t>Patrols need to provide feedback on patrol leaders success this year</a:t>
-              </a:r>
-            </a:p>
-            <a:p>
-              <a:pPr lvl="1">
-                <a:buFont typeface="Wingdings" pitchFamily="2" charset="2"/>
-                <a:buChar char="Ø"/>
-              </a:pPr>
-              <a:r>
-                <a:rPr lang="en-US" sz="1000" b="1" dirty="0">
-                  <a:latin typeface="Perpetua" pitchFamily="18" charset="0"/>
-                </a:rPr>
-                <a:t> </a:t>
-              </a:r>
-              <a:r>
-                <a:rPr lang="en-US" sz="1000" b="1" dirty="0" smtClean="0">
-                  <a:latin typeface="Perpetua" pitchFamily="18" charset="0"/>
-                </a:rPr>
-                <a:t>Age limits ? Rather not.</a:t>
-              </a:r>
-            </a:p>
-            <a:p>
-              <a:pPr lvl="1">
-                <a:buFont typeface="Wingdings" pitchFamily="2" charset="2"/>
-                <a:buChar char="Ø"/>
-              </a:pPr>
-              <a:r>
-                <a:rPr lang="en-US" sz="1000" b="1" dirty="0">
-                  <a:latin typeface="Perpetua" pitchFamily="18" charset="0"/>
-                </a:rPr>
-                <a:t> </a:t>
-              </a:r>
-              <a:r>
-                <a:rPr lang="en-US" sz="1000" b="1" dirty="0" smtClean="0">
-                  <a:latin typeface="Perpetua" pitchFamily="18" charset="0"/>
-                </a:rPr>
-                <a:t>EW – consider 9 month assignments </a:t>
-              </a:r>
-            </a:p>
-            <a:p>
-              <a:pPr lvl="1">
-                <a:buFont typeface="Wingdings" pitchFamily="2" charset="2"/>
-                <a:buChar char="Ø"/>
-              </a:pPr>
-              <a:r>
-                <a:rPr lang="en-US" sz="1000" b="1" dirty="0">
-                  <a:latin typeface="Perpetua" pitchFamily="18" charset="0"/>
-                </a:rPr>
-                <a:t> </a:t>
-              </a:r>
-              <a:r>
-                <a:rPr lang="en-US" sz="1000" b="1" dirty="0" smtClean="0">
-                  <a:latin typeface="Perpetua" pitchFamily="18" charset="0"/>
-                </a:rPr>
-                <a:t>Difference between having a position and being / demonstrating leadership</a:t>
-              </a:r>
-            </a:p>
-            <a:p>
-              <a:pPr lvl="1">
-                <a:buFont typeface="Wingdings" pitchFamily="2" charset="2"/>
-                <a:buChar char="Ø"/>
-              </a:pPr>
-              <a:endParaRPr lang="en-US" sz="1000" b="1" dirty="0">
-                <a:latin typeface="Perpetua" pitchFamily="18" charset="0"/>
-              </a:endParaRPr>
-            </a:p>
-            <a:p>
-              <a:pPr>
-                <a:buFont typeface="Wingdings" pitchFamily="2" charset="2"/>
-                <a:buChar char="Ø"/>
-              </a:pPr>
-              <a:r>
-                <a:rPr lang="en-US" sz="1000" b="1" dirty="0" smtClean="0">
-                  <a:latin typeface="Perpetua" pitchFamily="18" charset="0"/>
-                </a:rPr>
-                <a:t> Commissioner’s Challenge – check into why we’re not on the list !</a:t>
-              </a:r>
-            </a:p>
-            <a:p>
-              <a:pPr>
-                <a:buFont typeface="Wingdings" pitchFamily="2" charset="2"/>
-                <a:buChar char="Ø"/>
-              </a:pPr>
-              <a:r>
-                <a:rPr lang="en-US" sz="1000" b="1" dirty="0">
-                  <a:latin typeface="Perpetua" pitchFamily="18" charset="0"/>
-                </a:rPr>
-                <a:t> </a:t>
-              </a:r>
-              <a:r>
-                <a:rPr lang="en-US" sz="1000" b="1" dirty="0" smtClean="0">
-                  <a:latin typeface="Perpetua" pitchFamily="18" charset="0"/>
-                </a:rPr>
-                <a:t>Court of Honor  … we need to plan it.</a:t>
-              </a:r>
-            </a:p>
-            <a:p>
-              <a:pPr>
-                <a:buFont typeface="Wingdings" pitchFamily="2" charset="2"/>
-                <a:buChar char="Ø"/>
-              </a:pPr>
-              <a:r>
-                <a:rPr lang="en-US" sz="1000" b="1" dirty="0">
-                  <a:latin typeface="Perpetua" pitchFamily="18" charset="0"/>
-                </a:rPr>
-                <a:t> </a:t>
-              </a:r>
-              <a:r>
-                <a:rPr lang="en-US" sz="1000" b="1" dirty="0" smtClean="0">
-                  <a:latin typeface="Perpetua" pitchFamily="18" charset="0"/>
-                </a:rPr>
-                <a:t>Troop At A Glance -  do it !!</a:t>
-              </a:r>
-            </a:p>
-            <a:p>
-              <a:pPr>
-                <a:buFont typeface="Wingdings" pitchFamily="2" charset="2"/>
-                <a:buChar char="Ø"/>
-              </a:pPr>
-              <a:endParaRPr lang="en-US" sz="1000" b="1" dirty="0">
-                <a:latin typeface="Perpetua" pitchFamily="18" charset="0"/>
-              </a:endParaRPr>
-            </a:p>
-            <a:p>
-              <a:endParaRPr lang="en-US" sz="1000" b="1" dirty="0" smtClean="0">
-                <a:latin typeface="Perpetua" pitchFamily="18" charset="0"/>
-              </a:endParaRPr>
-            </a:p>
-          </p:txBody>
-        </p:sp>
-      </p:grpSp>
-      <p:sp>
-        <p:nvSpPr>
-          <p:cNvPr id="28" name="Rounded Rectangle 27"/>
-          <p:cNvSpPr/>
-          <p:nvPr/>
-        </p:nvSpPr>
-        <p:spPr>
-          <a:xfrm>
-            <a:off x="152400" y="5105400"/>
-            <a:ext cx="8848725" cy="228600"/>
-          </a:xfrm>
-          <a:prstGeom prst="roundRect">
-            <a:avLst/>
-          </a:prstGeom>
-          <a:ln>
-            <a:solidFill>
-              <a:schemeClr val="accent3">
-                <a:lumMod val="75000"/>
-              </a:schemeClr>
-            </a:solidFill>
-          </a:ln>
-        </p:spPr>
-        <p:style>
-          <a:lnRef idx="1">
-            <a:schemeClr val="accent3"/>
-          </a:lnRef>
-          <a:fillRef idx="2">
-            <a:schemeClr val="accent3"/>
-          </a:fillRef>
-          <a:effectRef idx="1">
-            <a:schemeClr val="accent3"/>
-          </a:effectRef>
-          <a:fontRef idx="minor">
-            <a:schemeClr val="dk1"/>
-          </a:fontRef>
-        </p:style>
-        <p:txBody>
-          <a:bodyPr rtlCol="0" anchor="ctr"/>
-          <a:lstStyle/>
-          <a:p>
-            <a:pPr algn="ctr"/>
-            <a:endParaRPr lang="en-US" dirty="0"/>
-          </a:p>
-        </p:txBody>
-      </p:sp>
-      <p:sp>
-        <p:nvSpPr>
-          <p:cNvPr id="29" name="TextBox 28"/>
-          <p:cNvSpPr txBox="1"/>
-          <p:nvPr/>
-        </p:nvSpPr>
-        <p:spPr>
-          <a:xfrm>
-            <a:off x="228601" y="5098792"/>
-            <a:ext cx="8831308" cy="261610"/>
-          </a:xfrm>
-          <a:prstGeom prst="rect">
-            <a:avLst/>
-          </a:prstGeom>
-          <a:noFill/>
-        </p:spPr>
-        <p:txBody>
-          <a:bodyPr wrap="square" rtlCol="0">
-            <a:spAutoFit/>
-          </a:bodyPr>
-          <a:lstStyle/>
-          <a:p>
-            <a:r>
-              <a:rPr lang="en-US" sz="1100" b="1" dirty="0" smtClean="0">
-                <a:latin typeface="Perpetua" pitchFamily="18" charset="0"/>
-              </a:rPr>
-              <a:t>Upcoming Troop Activities         /           Upcoming Troop Activities         /        Upcoming Troop Activities         /       Upcoming Troop Activities   </a:t>
-            </a:r>
-            <a:endParaRPr lang="en-US" sz="1100" b="1" dirty="0">
-              <a:latin typeface="Perpetua" pitchFamily="18" charset="0"/>
-            </a:endParaRPr>
-          </a:p>
-        </p:txBody>
-      </p:sp>
-      <p:grpSp>
-        <p:nvGrpSpPr>
-          <p:cNvPr id="49" name="Group 48"/>
-          <p:cNvGrpSpPr/>
-          <p:nvPr/>
-        </p:nvGrpSpPr>
-        <p:grpSpPr>
-          <a:xfrm>
-            <a:off x="4600575" y="5476875"/>
-            <a:ext cx="2228850" cy="1219200"/>
-            <a:chOff x="209550" y="5638800"/>
-            <a:chExt cx="2228850" cy="1066800"/>
-          </a:xfrm>
-        </p:grpSpPr>
-        <p:sp>
-          <p:nvSpPr>
-            <p:cNvPr id="32" name="Rounded Rectangle 31"/>
-            <p:cNvSpPr/>
-            <p:nvPr/>
-          </p:nvSpPr>
-          <p:spPr>
-            <a:xfrm>
-              <a:off x="228600" y="5638800"/>
-              <a:ext cx="2209800" cy="1066800"/>
-            </a:xfrm>
-            <a:prstGeom prst="roundRect">
-              <a:avLst/>
-            </a:prstGeom>
-          </p:spPr>
-          <p:style>
-            <a:lnRef idx="1">
-              <a:schemeClr val="dk1"/>
-            </a:lnRef>
-            <a:fillRef idx="2">
-              <a:schemeClr val="dk1"/>
-            </a:fillRef>
-            <a:effectRef idx="1">
-              <a:schemeClr val="dk1"/>
-            </a:effectRef>
-            <a:fontRef idx="minor">
-              <a:schemeClr val="dk1"/>
-            </a:fontRef>
-          </p:style>
-          <p:txBody>
-            <a:bodyPr rtlCol="0" anchor="ctr"/>
-            <a:lstStyle/>
-            <a:p>
-              <a:pPr algn="ctr"/>
-              <a:endParaRPr lang="en-US"/>
-            </a:p>
-          </p:txBody>
-        </p:sp>
-        <p:sp>
-          <p:nvSpPr>
-            <p:cNvPr id="33" name="TextBox 32"/>
-            <p:cNvSpPr txBox="1"/>
-            <p:nvPr/>
-          </p:nvSpPr>
-          <p:spPr>
-            <a:xfrm>
-              <a:off x="581025" y="5647551"/>
-              <a:ext cx="905040" cy="242374"/>
-            </a:xfrm>
-            <a:prstGeom prst="rect">
-              <a:avLst/>
-            </a:prstGeom>
-            <a:noFill/>
-          </p:spPr>
-          <p:txBody>
-            <a:bodyPr wrap="none" rtlCol="0">
-              <a:spAutoFit/>
-            </a:bodyPr>
-            <a:lstStyle/>
-            <a:p>
-              <a:r>
-                <a:rPr lang="en-US" sz="1200" b="1" dirty="0" smtClean="0"/>
-                <a:t>Nov 16 - 17 </a:t>
-              </a:r>
-            </a:p>
-          </p:txBody>
-        </p:sp>
-        <p:sp>
-          <p:nvSpPr>
-            <p:cNvPr id="34" name="TextBox 33"/>
-            <p:cNvSpPr txBox="1"/>
-            <p:nvPr/>
-          </p:nvSpPr>
-          <p:spPr>
-            <a:xfrm>
-              <a:off x="209550" y="5855553"/>
-              <a:ext cx="2181225" cy="697647"/>
-            </a:xfrm>
-            <a:prstGeom prst="rect">
-              <a:avLst/>
-            </a:prstGeom>
-            <a:noFill/>
-          </p:spPr>
-          <p:txBody>
-            <a:bodyPr wrap="square" rtlCol="0">
-              <a:noAutofit/>
-            </a:bodyPr>
-            <a:lstStyle/>
-            <a:p>
-              <a:r>
-                <a:rPr lang="en-US" sz="1000" b="1" dirty="0" smtClean="0"/>
-                <a:t>Trek:  Del Valle (Eagle’s View)</a:t>
-              </a:r>
-            </a:p>
-            <a:p>
-              <a:r>
-                <a:rPr lang="en-US" sz="1000" b="1" dirty="0" smtClean="0"/>
-                <a:t>Trek Leader:  </a:t>
-              </a:r>
-              <a:r>
-                <a:rPr lang="en-US" sz="1000" b="1" dirty="0" err="1" smtClean="0"/>
-                <a:t>Mukund</a:t>
-              </a:r>
-              <a:endParaRPr lang="en-US" sz="1000" b="1" dirty="0" smtClean="0"/>
-            </a:p>
-            <a:p>
-              <a:pPr>
-                <a:buFont typeface="Wingdings" pitchFamily="2" charset="2"/>
-                <a:buChar char="Ø"/>
-              </a:pPr>
-              <a:r>
-                <a:rPr lang="en-US" sz="1000" dirty="0" smtClean="0"/>
-                <a:t> Canoeing</a:t>
-              </a:r>
-            </a:p>
-            <a:p>
-              <a:pPr>
-                <a:buFont typeface="Wingdings" pitchFamily="2" charset="2"/>
-                <a:buChar char="Ø"/>
-              </a:pPr>
-              <a:r>
-                <a:rPr lang="en-US" sz="1000" dirty="0" smtClean="0"/>
-                <a:t> Backpacking ? </a:t>
-              </a:r>
-            </a:p>
-          </p:txBody>
-        </p:sp>
-      </p:grpSp>
-      <p:grpSp>
-        <p:nvGrpSpPr>
-          <p:cNvPr id="50" name="Group 49"/>
-          <p:cNvGrpSpPr/>
-          <p:nvPr/>
-        </p:nvGrpSpPr>
-        <p:grpSpPr>
-          <a:xfrm>
-            <a:off x="114300" y="5486400"/>
-            <a:ext cx="2228850" cy="1219200"/>
-            <a:chOff x="209550" y="5638800"/>
-            <a:chExt cx="2228850" cy="1066800"/>
-          </a:xfrm>
-        </p:grpSpPr>
-        <p:sp>
-          <p:nvSpPr>
-            <p:cNvPr id="51" name="Rounded Rectangle 50"/>
-            <p:cNvSpPr/>
-            <p:nvPr/>
-          </p:nvSpPr>
-          <p:spPr>
-            <a:xfrm>
-              <a:off x="228600" y="5638800"/>
-              <a:ext cx="2209800" cy="1066800"/>
-            </a:xfrm>
-            <a:prstGeom prst="roundRect">
-              <a:avLst/>
-            </a:prstGeom>
-          </p:spPr>
-          <p:style>
-            <a:lnRef idx="1">
-              <a:schemeClr val="dk1"/>
-            </a:lnRef>
-            <a:fillRef idx="2">
-              <a:schemeClr val="dk1"/>
-            </a:fillRef>
-            <a:effectRef idx="1">
-              <a:schemeClr val="dk1"/>
-            </a:effectRef>
-            <a:fontRef idx="minor">
-              <a:schemeClr val="dk1"/>
-            </a:fontRef>
-          </p:style>
-          <p:txBody>
-            <a:bodyPr rtlCol="0" anchor="ctr"/>
-            <a:lstStyle/>
-            <a:p>
-              <a:pPr algn="ctr"/>
-              <a:endParaRPr lang="en-US"/>
-            </a:p>
-          </p:txBody>
-        </p:sp>
-        <p:sp>
-          <p:nvSpPr>
-            <p:cNvPr id="52" name="TextBox 51"/>
-            <p:cNvSpPr txBox="1"/>
-            <p:nvPr/>
-          </p:nvSpPr>
-          <p:spPr>
-            <a:xfrm>
-              <a:off x="581025" y="5647551"/>
-              <a:ext cx="979755" cy="242374"/>
-            </a:xfrm>
-            <a:prstGeom prst="rect">
-              <a:avLst/>
-            </a:prstGeom>
-            <a:noFill/>
-          </p:spPr>
-          <p:txBody>
-            <a:bodyPr wrap="none" rtlCol="0">
-              <a:spAutoFit/>
-            </a:bodyPr>
-            <a:lstStyle/>
-            <a:p>
-              <a:r>
-                <a:rPr lang="en-US" sz="1200" b="1" dirty="0" smtClean="0"/>
-                <a:t>Sept. 21 - 22</a:t>
-              </a:r>
-            </a:p>
-          </p:txBody>
-        </p:sp>
-        <p:sp>
-          <p:nvSpPr>
-            <p:cNvPr id="53" name="TextBox 52"/>
+            <p:cNvPr id="61" name="TextBox 60"/>
             <p:cNvSpPr txBox="1"/>
             <p:nvPr/>
           </p:nvSpPr>
@@ -6373,145 +5405,15 @@
             <a:p>
               <a:r>
                 <a:rPr lang="en-US" sz="1000" b="1" dirty="0" smtClean="0"/>
-                <a:t>Trek: Pinnacles (car camping)</a:t>
+                <a:t>Trek: </a:t>
               </a:r>
-            </a:p>
-            <a:p>
               <a:r>
                 <a:rPr lang="en-US" sz="1000" b="1" dirty="0" smtClean="0"/>
-                <a:t>Trek Leader: Max</a:t>
+                <a:t>Beach Campout (</a:t>
               </a:r>
-            </a:p>
-            <a:p>
-              <a:pPr>
-                <a:buFont typeface="Wingdings" pitchFamily="2" charset="2"/>
-                <a:buChar char="Ø"/>
-              </a:pPr>
-              <a:r>
-                <a:rPr lang="en-US" sz="1000" dirty="0" smtClean="0"/>
-                <a:t> </a:t>
-              </a:r>
-            </a:p>
-            <a:p>
-              <a:pPr>
-                <a:buFont typeface="Wingdings" pitchFamily="2" charset="2"/>
-                <a:buChar char="Ø"/>
-              </a:pPr>
-              <a:r>
-                <a:rPr lang="en-US" sz="1000" dirty="0"/>
-                <a:t> </a:t>
-              </a:r>
-              <a:endParaRPr lang="en-US" sz="1000" dirty="0" smtClean="0"/>
-            </a:p>
-          </p:txBody>
-        </p:sp>
-      </p:grpSp>
-      <p:grpSp>
-        <p:nvGrpSpPr>
-          <p:cNvPr id="54" name="Group 53"/>
-          <p:cNvGrpSpPr/>
-          <p:nvPr/>
-        </p:nvGrpSpPr>
-        <p:grpSpPr>
-          <a:xfrm>
-            <a:off x="6838950" y="5486400"/>
-            <a:ext cx="2228850" cy="1219200"/>
-            <a:chOff x="209550" y="5638800"/>
-            <a:chExt cx="2228850" cy="1066800"/>
-          </a:xfrm>
-        </p:grpSpPr>
-        <p:sp>
-          <p:nvSpPr>
-            <p:cNvPr id="55" name="Rounded Rectangle 54"/>
-            <p:cNvSpPr/>
-            <p:nvPr/>
-          </p:nvSpPr>
-          <p:spPr>
-            <a:xfrm>
-              <a:off x="228600" y="5638800"/>
-              <a:ext cx="2209800" cy="1066800"/>
-            </a:xfrm>
-            <a:prstGeom prst="roundRect">
-              <a:avLst/>
-            </a:prstGeom>
-          </p:spPr>
-          <p:style>
-            <a:lnRef idx="1">
-              <a:schemeClr val="dk1"/>
-            </a:lnRef>
-            <a:fillRef idx="2">
-              <a:schemeClr val="dk1"/>
-            </a:fillRef>
-            <a:effectRef idx="1">
-              <a:schemeClr val="dk1"/>
-            </a:effectRef>
-            <a:fontRef idx="minor">
-              <a:schemeClr val="dk1"/>
-            </a:fontRef>
-          </p:style>
-          <p:txBody>
-            <a:bodyPr rtlCol="0" anchor="ctr"/>
-            <a:lstStyle/>
-            <a:p>
-              <a:pPr algn="ctr"/>
-              <a:endParaRPr lang="en-US"/>
-            </a:p>
-          </p:txBody>
-        </p:sp>
-        <p:sp>
-          <p:nvSpPr>
-            <p:cNvPr id="56" name="TextBox 55"/>
-            <p:cNvSpPr txBox="1"/>
-            <p:nvPr/>
-          </p:nvSpPr>
-          <p:spPr>
-            <a:xfrm>
-              <a:off x="581025" y="5647551"/>
-              <a:ext cx="760545" cy="242374"/>
-            </a:xfrm>
-            <a:prstGeom prst="rect">
-              <a:avLst/>
-            </a:prstGeom>
-            <a:noFill/>
-          </p:spPr>
-          <p:txBody>
-            <a:bodyPr wrap="none" rtlCol="0">
-              <a:spAutoFit/>
-            </a:bodyPr>
-            <a:lstStyle/>
-            <a:p>
-              <a:r>
-                <a:rPr lang="en-US" sz="1200" b="1" dirty="0" smtClean="0"/>
-                <a:t>Dec 7 – 8 </a:t>
-              </a:r>
-            </a:p>
-          </p:txBody>
-        </p:sp>
-        <p:sp>
-          <p:nvSpPr>
-            <p:cNvPr id="57" name="TextBox 56"/>
-            <p:cNvSpPr txBox="1"/>
-            <p:nvPr/>
-          </p:nvSpPr>
-          <p:spPr>
-            <a:xfrm>
-              <a:off x="209550" y="5855553"/>
-              <a:ext cx="2118619" cy="783372"/>
-            </a:xfrm>
-            <a:prstGeom prst="rect">
-              <a:avLst/>
-            </a:prstGeom>
-            <a:noFill/>
-          </p:spPr>
-          <p:txBody>
-            <a:bodyPr wrap="square" rtlCol="0">
-              <a:noAutofit/>
-            </a:bodyPr>
-            <a:lstStyle/>
-            <a:p>
               <a:r>
                 <a:rPr lang="en-US" sz="1000" b="1" dirty="0" smtClean="0"/>
-                <a:t>Trek:  All Night Rock Climbing</a:t>
+                <a:t>car camping)</a:t>
               </a:r>
             </a:p>
             <a:p>
@@ -6520,8 +5422,8 @@
                 <a:t>Trek Leader: </a:t>
               </a:r>
               <a:r>
-                <a:rPr lang="en-US" sz="1000" b="1" dirty="0" err="1" smtClean="0"/>
-                <a:t>Itzik</a:t>
+                <a:rPr lang="en-US" sz="1000" b="1" dirty="0" smtClean="0"/>
+                <a:t>Alan Zhang</a:t>
               </a:r>
               <a:endParaRPr lang="en-US" sz="1000" b="1" dirty="0" smtClean="0"/>
             </a:p>
@@ -6534,6 +5436,19 @@
                 <a:rPr lang="en-US" sz="1000" dirty="0" smtClean="0"/>
                 <a:t> </a:t>
               </a:r>
+              <a:r>
+                <a:rPr lang="en-US" sz="1000" dirty="0" smtClean="0"/>
+                <a:t>Invite </a:t>
+              </a:r>
+              <a:r>
+                <a:rPr lang="en-US" sz="1000" dirty="0" err="1" smtClean="0"/>
+                <a:t>Webelos</a:t>
+              </a:r>
+              <a:r>
+                <a:rPr lang="en-US" sz="1000" dirty="0" smtClean="0"/>
+                <a:t> scouts</a:t>
+              </a:r>
+              <a:endParaRPr lang="en-US" sz="1000" dirty="0" smtClean="0"/>
             </a:p>
             <a:p>
               <a:pPr>
@@ -6544,171 +5459,16 @@
                 <a:rPr lang="en-US" sz="1000" dirty="0"/>
                 <a:t> </a:t>
               </a:r>
-              <a:endParaRPr lang="en-US" sz="1000" dirty="0" smtClean="0"/>
-            </a:p>
-          </p:txBody>
-        </p:sp>
-      </p:grpSp>
-      <p:grpSp>
-        <p:nvGrpSpPr>
-          <p:cNvPr id="2" name="Group 1"/>
-          <p:cNvGrpSpPr/>
-          <p:nvPr/>
-        </p:nvGrpSpPr>
-        <p:grpSpPr>
-          <a:xfrm>
-            <a:off x="2362200" y="5486400"/>
-            <a:ext cx="2228850" cy="1219200"/>
-            <a:chOff x="2362200" y="5486400"/>
-            <a:chExt cx="2228850" cy="1219200"/>
-          </a:xfrm>
-        </p:grpSpPr>
-        <p:sp>
-          <p:nvSpPr>
-            <p:cNvPr id="59" name="Rounded Rectangle 58"/>
-            <p:cNvSpPr/>
-            <p:nvPr/>
-          </p:nvSpPr>
-          <p:spPr>
-            <a:xfrm>
-              <a:off x="2381250" y="5486400"/>
-              <a:ext cx="2209800" cy="1219200"/>
-            </a:xfrm>
-            <a:prstGeom prst="roundRect">
-              <a:avLst/>
-            </a:prstGeom>
-          </p:spPr>
-          <p:style>
-            <a:lnRef idx="1">
-              <a:schemeClr val="dk1"/>
-            </a:lnRef>
-            <a:fillRef idx="2">
-              <a:schemeClr val="dk1"/>
-            </a:fillRef>
-            <a:effectRef idx="1">
-              <a:schemeClr val="dk1"/>
-            </a:effectRef>
-            <a:fontRef idx="minor">
-              <a:schemeClr val="dk1"/>
-            </a:fontRef>
-          </p:style>
-          <p:txBody>
-            <a:bodyPr rtlCol="0" anchor="ctr"/>
-            <a:lstStyle/>
-            <a:p>
-              <a:pPr algn="ctr"/>
-              <a:endParaRPr lang="en-US"/>
-            </a:p>
-          </p:txBody>
-        </p:sp>
-        <p:sp>
-          <p:nvSpPr>
-            <p:cNvPr id="60" name="TextBox 59"/>
-            <p:cNvSpPr txBox="1"/>
-            <p:nvPr/>
-          </p:nvSpPr>
-          <p:spPr>
-            <a:xfrm>
-              <a:off x="2438400" y="5496401"/>
-              <a:ext cx="940582" cy="276999"/>
-            </a:xfrm>
-            <a:prstGeom prst="rect">
-              <a:avLst/>
-            </a:prstGeom>
-            <a:noFill/>
-          </p:spPr>
-          <p:txBody>
-            <a:bodyPr wrap="none" rtlCol="0">
-              <a:spAutoFit/>
-            </a:bodyPr>
-            <a:lstStyle/>
-            <a:p>
-              <a:r>
-                <a:rPr lang="en-US" sz="1200" b="1" dirty="0" smtClean="0"/>
-                <a:t>Oct. 19 – 20 </a:t>
-              </a:r>
-            </a:p>
-          </p:txBody>
-        </p:sp>
-        <p:sp>
-          <p:nvSpPr>
-            <p:cNvPr id="61" name="TextBox 60"/>
-            <p:cNvSpPr txBox="1"/>
-            <p:nvPr/>
-          </p:nvSpPr>
-          <p:spPr>
-            <a:xfrm>
-              <a:off x="2362200" y="5734118"/>
-              <a:ext cx="2125416" cy="971482"/>
-            </a:xfrm>
-            <a:prstGeom prst="rect">
-              <a:avLst/>
-            </a:prstGeom>
-            <a:noFill/>
-          </p:spPr>
-          <p:txBody>
-            <a:bodyPr wrap="square" rtlCol="0">
-              <a:noAutofit/>
-            </a:bodyPr>
-            <a:lstStyle/>
-            <a:p>
-              <a:r>
-                <a:rPr lang="en-US" sz="1000" b="1" dirty="0" smtClean="0"/>
-                <a:t>Trek:  Beach Campout (Brighton)</a:t>
-              </a:r>
-            </a:p>
-            <a:p>
-              <a:r>
-                <a:rPr lang="en-US" sz="1000" b="1" dirty="0" smtClean="0"/>
-                <a:t>Trek Leader: Allen</a:t>
-              </a:r>
-            </a:p>
-            <a:p>
-              <a:pPr>
-                <a:buFont typeface="Wingdings" pitchFamily="2" charset="2"/>
-                <a:buChar char="Ø"/>
-              </a:pPr>
               <a:r>
                 <a:rPr lang="en-US" sz="1000" dirty="0" smtClean="0"/>
-                <a:t> </a:t>
+                <a:t>Car camping – great campout for new parents!</a:t>
               </a:r>
-            </a:p>
-            <a:p>
-              <a:pPr>
-                <a:buFont typeface="Wingdings" pitchFamily="2" charset="2"/>
-                <a:buChar char="Ø"/>
-              </a:pPr>
-              <a:r>
-                <a:rPr lang="en-US" sz="1000" dirty="0" smtClean="0"/>
-                <a:t> </a:t>
-              </a:r>
-            </a:p>
-            <a:p>
-              <a:pPr>
-                <a:buFont typeface="Wingdings" pitchFamily="2" charset="2"/>
-                <a:buChar char="Ø"/>
-              </a:pPr>
-              <a:r>
-                <a:rPr lang="en-US" sz="1000" dirty="0" smtClean="0"/>
-                <a:t> </a:t>
-              </a:r>
-            </a:p>
-            <a:p>
-              <a:pPr>
-                <a:buFont typeface="Wingdings" pitchFamily="2" charset="2"/>
-                <a:buChar char="Ø"/>
-              </a:pPr>
               <a:endParaRPr lang="en-US" sz="1000" dirty="0" smtClean="0"/>
             </a:p>
           </p:txBody>
         </p:sp>
       </p:grpSp>
     </p:spTree>
-    <p:extLst>
-      <p:ext uri="{BB962C8B-B14F-4D97-AF65-F5344CB8AC3E}">
-        <p14:creationId xmlns:p14="http://schemas.microsoft.com/office/powerpoint/2010/main" val="3299097956"/>
-      </p:ext>
-    </p:extLst>
   </p:cSld>
   <p:clrMapOvr>
     <a:masterClrMapping/>
@@ -6716,7 +5476,7 @@
 </p:sld>
 </file>
 
-<file path=ppt/slides/slide3.xml><?xml version="1.0" encoding="utf-8"?>
+<file path=ppt/slides/slide2.xml><?xml version="1.0" encoding="utf-8"?>
 <p:sld xmlns:a="http://schemas.openxmlformats.org/drawingml/2006/main" xmlns:r="http://schemas.openxmlformats.org/officeDocument/2006/relationships" xmlns:p="http://schemas.openxmlformats.org/presentationml/2006/main">
   <p:cSld>
     <p:spTree>
@@ -8255,13 +7015,13 @@
           <p:nvPr>
             <p:extLst>
               <p:ext uri="{D42A27DB-BD31-4B8C-83A1-F6EECF244321}">
-                <p14:modId xmlns:p14="http://schemas.microsoft.com/office/powerpoint/2010/main" val="3052317397"/>
+                <p14:modId xmlns:p14="http://schemas.microsoft.com/office/powerpoint/2010/main" val="432981781"/>
               </p:ext>
             </p:extLst>
           </p:nvPr>
         </p:nvGraphicFramePr>
         <p:xfrm>
-          <a:off x="1943100" y="6477000"/>
+          <a:off x="76200" y="6477000"/>
           <a:ext cx="5257800" cy="304800"/>
         </p:xfrm>
         <a:graphic>
@@ -8312,7 +7072,7 @@
           <p:nvPr>
             <p:extLst>
               <p:ext uri="{D42A27DB-BD31-4B8C-83A1-F6EECF244321}">
-                <p14:modId xmlns:p14="http://schemas.microsoft.com/office/powerpoint/2010/main" val="82935250"/>
+                <p14:modId xmlns:p14="http://schemas.microsoft.com/office/powerpoint/2010/main" val="102149639"/>
               </p:ext>
             </p:extLst>
           </p:nvPr>
@@ -8411,7 +7171,7 @@
                         </a:rPr>
                         <a:t>Daniel Pickering</a:t>
                       </a:r>
-                      <a:endParaRPr lang="en-US" sz="900" dirty="0">
+                      <a:endParaRPr lang="en-US" sz="900" b="1" dirty="0">
                         <a:solidFill>
                           <a:srgbClr val="000000"/>
                         </a:solidFill>
@@ -8441,7 +7201,7 @@
                         </a:spcAft>
                       </a:pPr>
                       <a:r>
-                        <a:rPr lang="en-US" sz="900" b="0" dirty="0" smtClean="0">
+                        <a:rPr lang="en-US" sz="900" b="0" i="1" dirty="0" smtClean="0">
                           <a:solidFill>
                             <a:srgbClr val="000000"/>
                           </a:solidFill>
@@ -8452,7 +7212,7 @@
                         </a:rPr>
                         <a:t>Charter Organization Representative </a:t>
                       </a:r>
-                      <a:endParaRPr lang="en-US" sz="900" b="0" dirty="0">
+                      <a:endParaRPr lang="en-US" sz="900" b="0" i="1" dirty="0">
                         <a:solidFill>
                           <a:srgbClr val="000000"/>
                         </a:solidFill>
@@ -8495,7 +7255,7 @@
                         </a:rPr>
                         <a:t>Scott Davidson</a:t>
                       </a:r>
-                      <a:endParaRPr lang="en-US" sz="900" dirty="0">
+                      <a:endParaRPr lang="en-US" sz="900" b="1" dirty="0">
                         <a:solidFill>
                           <a:srgbClr val="000000"/>
                         </a:solidFill>
@@ -8525,7 +7285,7 @@
                         </a:spcAft>
                       </a:pPr>
                       <a:r>
-                        <a:rPr lang="en-US" sz="900" dirty="0" smtClean="0">
+                        <a:rPr lang="en-US" sz="900" b="0" i="1" dirty="0" smtClean="0">
                           <a:solidFill>
                             <a:srgbClr val="000000"/>
                           </a:solidFill>
@@ -8536,7 +7296,7 @@
                         </a:rPr>
                         <a:t>Committee Chairman</a:t>
                       </a:r>
-                      <a:endParaRPr lang="en-US" sz="900" dirty="0">
+                      <a:endParaRPr lang="en-US" sz="900" b="0" i="1" dirty="0">
                         <a:solidFill>
                           <a:srgbClr val="000000"/>
                         </a:solidFill>
@@ -8579,7 +7339,7 @@
                         </a:rPr>
                         <a:t>Mike Klein</a:t>
                       </a:r>
-                      <a:endParaRPr lang="en-US" sz="900" dirty="0">
+                      <a:endParaRPr lang="en-US" sz="900" b="1" dirty="0">
                         <a:solidFill>
                           <a:srgbClr val="000000"/>
                         </a:solidFill>
@@ -8609,7 +7369,7 @@
                         </a:spcAft>
                       </a:pPr>
                       <a:r>
-                        <a:rPr lang="en-US" sz="900" dirty="0" smtClean="0">
+                        <a:rPr lang="en-US" sz="900" b="0" i="1" dirty="0" smtClean="0">
                           <a:solidFill>
                             <a:srgbClr val="000000"/>
                           </a:solidFill>
@@ -8620,7 +7380,7 @@
                         </a:rPr>
                         <a:t>Scout Master</a:t>
                       </a:r>
-                      <a:endParaRPr lang="en-US" sz="900" dirty="0">
+                      <a:endParaRPr lang="en-US" sz="900" b="0" i="1" dirty="0">
                         <a:solidFill>
                           <a:srgbClr val="000000"/>
                         </a:solidFill>
@@ -8687,7 +7447,7 @@
                         </a:rPr>
                         <a:t>Bapat</a:t>
                       </a:r>
-                      <a:endParaRPr lang="en-US" sz="900" dirty="0">
+                      <a:endParaRPr lang="en-US" sz="900" b="1" dirty="0">
                         <a:solidFill>
                           <a:srgbClr val="000000"/>
                         </a:solidFill>
@@ -8717,7 +7477,7 @@
                         </a:spcAft>
                       </a:pPr>
                       <a:r>
-                        <a:rPr lang="en-US" sz="900" dirty="0" smtClean="0">
+                        <a:rPr lang="en-US" sz="900" b="0" i="1" dirty="0" smtClean="0">
                           <a:solidFill>
                             <a:srgbClr val="000000"/>
                           </a:solidFill>
@@ -8728,7 +7488,7 @@
                         </a:rPr>
                         <a:t>Asst. Scout Master</a:t>
                       </a:r>
-                      <a:endParaRPr lang="en-US" sz="900" dirty="0">
+                      <a:endParaRPr lang="en-US" sz="900" b="0" i="1" dirty="0">
                         <a:solidFill>
                           <a:srgbClr val="000000"/>
                         </a:solidFill>
@@ -8783,7 +7543,7 @@
                         </a:rPr>
                         <a:t>Besser</a:t>
                       </a:r>
-                      <a:endParaRPr lang="en-US" sz="900" dirty="0">
+                      <a:endParaRPr lang="en-US" sz="900" b="1" dirty="0">
                         <a:solidFill>
                           <a:srgbClr val="000000"/>
                         </a:solidFill>
@@ -8813,7 +7573,7 @@
                         </a:spcAft>
                       </a:pPr>
                       <a:r>
-                        <a:rPr lang="en-US" sz="900" dirty="0" smtClean="0">
+                        <a:rPr lang="en-US" sz="900" b="0" i="1" dirty="0" smtClean="0">
                           <a:solidFill>
                             <a:srgbClr val="000000"/>
                           </a:solidFill>
@@ -8824,7 +7584,7 @@
                         </a:rPr>
                         <a:t>Asst. Scout Master</a:t>
                       </a:r>
-                      <a:endParaRPr lang="en-US" sz="900" dirty="0">
+                      <a:endParaRPr lang="en-US" sz="900" b="0" i="1" dirty="0">
                         <a:solidFill>
                           <a:srgbClr val="000000"/>
                         </a:solidFill>
@@ -8891,7 +7651,7 @@
                         </a:rPr>
                         <a:t>Gilboa</a:t>
                       </a:r>
-                      <a:endParaRPr lang="en-US" sz="900" dirty="0">
+                      <a:endParaRPr lang="en-US" sz="900" b="1" dirty="0">
                         <a:solidFill>
                           <a:srgbClr val="000000"/>
                         </a:solidFill>
@@ -8927,7 +7687,7 @@
                         <a:defRPr/>
                       </a:pPr>
                       <a:r>
-                        <a:rPr lang="en-US" sz="900" dirty="0" smtClean="0">
+                        <a:rPr lang="en-US" sz="900" b="0" i="1" dirty="0" smtClean="0">
                           <a:solidFill>
                             <a:srgbClr val="000000"/>
                           </a:solidFill>
@@ -8972,7 +7732,7 @@
                         </a:rPr>
                         <a:t>Sam Sun</a:t>
                       </a:r>
-                      <a:endParaRPr lang="en-US" sz="900" dirty="0">
+                      <a:endParaRPr lang="en-US" sz="900" b="1" dirty="0">
                         <a:solidFill>
                           <a:srgbClr val="000000"/>
                         </a:solidFill>
@@ -9002,7 +7762,7 @@
                         </a:spcAft>
                       </a:pPr>
                       <a:r>
-                        <a:rPr lang="en-US" sz="900" dirty="0" smtClean="0">
+                        <a:rPr lang="en-US" sz="900" b="0" i="1" dirty="0" smtClean="0">
                           <a:solidFill>
                             <a:srgbClr val="000000"/>
                           </a:solidFill>
@@ -9013,7 +7773,7 @@
                         </a:rPr>
                         <a:t>Asst. Scout Master</a:t>
                       </a:r>
-                      <a:endParaRPr lang="en-US" sz="900" dirty="0">
+                      <a:endParaRPr lang="en-US" sz="900" b="0" i="1" dirty="0">
                         <a:solidFill>
                           <a:srgbClr val="000000"/>
                         </a:solidFill>
@@ -9056,7 +7816,7 @@
                         </a:rPr>
                         <a:t>Rick Adolf</a:t>
                       </a:r>
-                      <a:endParaRPr lang="en-US" sz="900" dirty="0">
+                      <a:endParaRPr lang="en-US" sz="900" b="1" dirty="0">
                         <a:solidFill>
                           <a:srgbClr val="000000"/>
                         </a:solidFill>
@@ -9086,7 +7846,7 @@
                         </a:spcAft>
                       </a:pPr>
                       <a:r>
-                        <a:rPr lang="en-US" sz="900" dirty="0" smtClean="0">
+                        <a:rPr lang="en-US" sz="900" b="0" i="1" dirty="0" smtClean="0">
                           <a:solidFill>
                             <a:srgbClr val="000000"/>
                           </a:solidFill>
@@ -9097,7 +7857,7 @@
                         </a:rPr>
                         <a:t>Asst. Scout Master</a:t>
                       </a:r>
-                      <a:endParaRPr lang="en-US" sz="900" dirty="0">
+                      <a:endParaRPr lang="en-US" sz="900" b="0" i="1" dirty="0">
                         <a:solidFill>
                           <a:srgbClr val="000000"/>
                         </a:solidFill>
@@ -9152,7 +7912,7 @@
                         </a:rPr>
                         <a:t>Wilford</a:t>
                       </a:r>
-                      <a:endParaRPr lang="en-US" sz="900" dirty="0">
+                      <a:endParaRPr lang="en-US" sz="900" b="1" dirty="0">
                         <a:solidFill>
                           <a:srgbClr val="000000"/>
                         </a:solidFill>
@@ -9182,7 +7942,7 @@
                         </a:spcAft>
                       </a:pPr>
                       <a:r>
-                        <a:rPr lang="en-US" sz="900" dirty="0" smtClean="0">
+                        <a:rPr lang="en-US" sz="900" b="0" i="1" dirty="0" smtClean="0">
                           <a:solidFill>
                             <a:srgbClr val="000000"/>
                           </a:solidFill>
@@ -9193,7 +7953,7 @@
                         </a:rPr>
                         <a:t>Asst. Scout Master</a:t>
                       </a:r>
-                      <a:endParaRPr lang="en-US" sz="900" dirty="0">
+                      <a:endParaRPr lang="en-US" sz="900" b="0" i="1" dirty="0">
                         <a:solidFill>
                           <a:srgbClr val="000000"/>
                         </a:solidFill>
@@ -9251,7 +8011,7 @@
                         </a:rPr>
                         <a:t>Uyematsu</a:t>
                       </a:r>
-                      <a:endParaRPr lang="en-US" sz="900" dirty="0">
+                      <a:endParaRPr lang="en-US" sz="900" b="1" dirty="0">
                         <a:solidFill>
                           <a:srgbClr val="000000"/>
                         </a:solidFill>
@@ -9281,7 +8041,7 @@
                         </a:spcAft>
                       </a:pPr>
                       <a:r>
-                        <a:rPr lang="en-US" sz="900" dirty="0" smtClean="0">
+                        <a:rPr lang="en-US" sz="900" b="0" i="1" dirty="0" smtClean="0">
                           <a:solidFill>
                             <a:srgbClr val="000000"/>
                           </a:solidFill>
@@ -9292,7 +8052,7 @@
                         </a:rPr>
                         <a:t>Asst. Scout Master</a:t>
                       </a:r>
-                      <a:endParaRPr lang="en-US" sz="900" dirty="0">
+                      <a:endParaRPr lang="en-US" sz="900" b="0" i="1" dirty="0">
                         <a:solidFill>
                           <a:srgbClr val="000000"/>
                         </a:solidFill>
@@ -9335,7 +8095,7 @@
                         </a:rPr>
                         <a:t>Riley Howard</a:t>
                       </a:r>
-                      <a:endParaRPr lang="en-US" sz="900" dirty="0">
+                      <a:endParaRPr lang="en-US" sz="900" b="1" dirty="0">
                         <a:solidFill>
                           <a:srgbClr val="000000"/>
                         </a:solidFill>
@@ -9365,7 +8125,7 @@
                         </a:spcAft>
                       </a:pPr>
                       <a:r>
-                        <a:rPr lang="en-US" sz="900" dirty="0" smtClean="0">
+                        <a:rPr lang="en-US" sz="900" b="0" i="1" dirty="0" smtClean="0">
                           <a:solidFill>
                             <a:srgbClr val="000000"/>
                           </a:solidFill>
@@ -9376,7 +8136,7 @@
                         </a:rPr>
                         <a:t>Asst. Scout Master</a:t>
                       </a:r>
-                      <a:endParaRPr lang="en-US" sz="900" dirty="0">
+                      <a:endParaRPr lang="en-US" sz="900" b="0" i="1" dirty="0">
                         <a:solidFill>
                           <a:srgbClr val="000000"/>
                         </a:solidFill>
@@ -9419,7 +8179,7 @@
                         </a:rPr>
                         <a:t>Stan Schneider</a:t>
                       </a:r>
-                      <a:endParaRPr lang="en-US" sz="900" dirty="0">
+                      <a:endParaRPr lang="en-US" sz="900" b="1" dirty="0">
                         <a:solidFill>
                           <a:srgbClr val="000000"/>
                         </a:solidFill>
@@ -9449,7 +8209,7 @@
                         </a:spcAft>
                       </a:pPr>
                       <a:r>
-                        <a:rPr lang="en-US" sz="900" dirty="0" smtClean="0">
+                        <a:rPr lang="en-US" sz="900" b="0" i="1" dirty="0" smtClean="0">
                           <a:solidFill>
                             <a:srgbClr val="000000"/>
                           </a:solidFill>
@@ -9460,7 +8220,7 @@
                         </a:rPr>
                         <a:t>Asst. Scout Master</a:t>
                       </a:r>
-                      <a:endParaRPr lang="en-US" sz="900" dirty="0">
+                      <a:endParaRPr lang="en-US" sz="900" b="0" i="1" dirty="0">
                         <a:solidFill>
                           <a:srgbClr val="000000"/>
                         </a:solidFill>
@@ -9527,7 +8287,7 @@
                         </a:rPr>
                         <a:t>Madhugiri</a:t>
                       </a:r>
-                      <a:endParaRPr lang="en-US" sz="900" dirty="0">
+                      <a:endParaRPr lang="en-US" sz="900" b="1" dirty="0">
                         <a:solidFill>
                           <a:srgbClr val="000000"/>
                         </a:solidFill>
@@ -9557,7 +8317,7 @@
                         </a:spcAft>
                       </a:pPr>
                       <a:r>
-                        <a:rPr lang="en-US" sz="900" dirty="0" smtClean="0">
+                        <a:rPr lang="en-US" sz="900" b="0" i="1" dirty="0" smtClean="0">
                           <a:solidFill>
                             <a:srgbClr val="000000"/>
                           </a:solidFill>
@@ -9569,7 +8329,7 @@
                         <a:t>Asst.</a:t>
                       </a:r>
                       <a:r>
-                        <a:rPr lang="en-US" sz="900" baseline="0" dirty="0" smtClean="0">
+                        <a:rPr lang="en-US" sz="900" b="0" i="1" baseline="0" dirty="0" smtClean="0">
                           <a:solidFill>
                             <a:srgbClr val="000000"/>
                           </a:solidFill>
@@ -9580,7 +8340,7 @@
                         </a:rPr>
                         <a:t> Scout Master</a:t>
                       </a:r>
-                      <a:endParaRPr lang="en-US" sz="900" dirty="0">
+                      <a:endParaRPr lang="en-US" sz="900" b="0" i="1" dirty="0">
                         <a:solidFill>
                           <a:srgbClr val="000000"/>
                         </a:solidFill>
@@ -9621,9 +8381,9 @@
                           <a:ea typeface="Calibri"/>
                           <a:cs typeface="Times New Roman"/>
                         </a:rPr>
-                        <a:t>Cindy Mao</a:t>
-                      </a:r>
-                      <a:endParaRPr lang="en-US" sz="900" dirty="0">
+                        <a:t>Jenny Sun</a:t>
+                      </a:r>
+                      <a:endParaRPr lang="en-US" sz="900" b="1" dirty="0">
                         <a:solidFill>
                           <a:srgbClr val="000000"/>
                         </a:solidFill>
@@ -9653,7 +8413,7 @@
                         </a:spcAft>
                       </a:pPr>
                       <a:r>
-                        <a:rPr lang="en-US" sz="900" dirty="0" smtClean="0">
+                        <a:rPr lang="en-US" sz="900" b="0" i="1" dirty="0" smtClean="0">
                           <a:solidFill>
                             <a:srgbClr val="000000"/>
                           </a:solidFill>
@@ -9664,7 +8424,7 @@
                         </a:rPr>
                         <a:t>Treasurer</a:t>
                       </a:r>
-                      <a:endParaRPr lang="en-US" sz="900" dirty="0">
+                      <a:endParaRPr lang="en-US" sz="900" b="0" i="1" dirty="0">
                         <a:solidFill>
                           <a:srgbClr val="000000"/>
                         </a:solidFill>
@@ -9696,6 +8456,18 @@
                         </a:spcAft>
                       </a:pPr>
                       <a:r>
+                        <a:rPr lang="en-US" sz="900" b="1" dirty="0" err="1" smtClean="0">
+                          <a:solidFill>
+                            <a:srgbClr val="000000"/>
+                          </a:solidFill>
+                          <a:effectLst/>
+                          <a:latin typeface="Calibri"/>
+                          <a:ea typeface="Calibri"/>
+                          <a:cs typeface="Times New Roman"/>
+                        </a:rPr>
+                        <a:t>Sejal</a:t>
+                      </a:r>
+                      <a:r>
                         <a:rPr lang="en-US" sz="900" b="1" dirty="0" smtClean="0">
                           <a:solidFill>
                             <a:srgbClr val="000000"/>
@@ -9705,9 +8477,9 @@
                           <a:ea typeface="Calibri"/>
                           <a:cs typeface="Times New Roman"/>
                         </a:rPr>
-                        <a:t>Popcorn Kernels</a:t>
-                      </a:r>
-                      <a:endParaRPr lang="en-US" sz="900" dirty="0">
+                        <a:t> Patel, Antonio Dias</a:t>
+                      </a:r>
+                      <a:endParaRPr lang="en-US" sz="900" b="1" dirty="0">
                         <a:solidFill>
                           <a:srgbClr val="000000"/>
                         </a:solidFill>
@@ -9725,6 +8497,37 @@
                     <a:bodyPr/>
                     <a:lstStyle/>
                     <a:p>
+                      <a:pPr marL="0" marR="0" indent="0" algn="l" defTabSz="914400" rtl="0" eaLnBrk="1" fontAlgn="auto" latinLnBrk="0" hangingPunct="1">
+                        <a:lnSpc>
+                          <a:spcPct val="115000"/>
+                        </a:lnSpc>
+                        <a:spcBef>
+                          <a:spcPts val="0"/>
+                        </a:spcBef>
+                        <a:spcAft>
+                          <a:spcPts val="0"/>
+                        </a:spcAft>
+                        <a:buClrTx/>
+                        <a:buSzTx/>
+                        <a:buFontTx/>
+                        <a:buNone/>
+                        <a:tabLst/>
+                        <a:defRPr/>
+                      </a:pPr>
+                      <a:r>
+                        <a:rPr lang="en-US" sz="900" b="0" i="1" dirty="0" smtClean="0">
+                          <a:solidFill>
+                            <a:srgbClr val="000000"/>
+                          </a:solidFill>
+                          <a:effectLst/>
+                          <a:latin typeface="+mn-lt"/>
+                          <a:ea typeface="Calibri"/>
+                          <a:cs typeface="Times New Roman"/>
+                        </a:rPr>
+                        <a:t>Popcorn Kernels</a:t>
+                      </a:r>
+                    </a:p>
+                    <a:p>
                       <a:pPr marL="0" marR="0">
                         <a:lnSpc>
                           <a:spcPct val="115000"/>
@@ -9736,31 +8539,7 @@
                           <a:spcPts val="0"/>
                         </a:spcAft>
                       </a:pPr>
-                      <a:r>
-                        <a:rPr lang="en-US" sz="900" dirty="0" err="1" smtClean="0">
-                          <a:solidFill>
-                            <a:srgbClr val="000000"/>
-                          </a:solidFill>
-                          <a:effectLst/>
-                          <a:latin typeface="Calibri"/>
-                          <a:ea typeface="Calibri"/>
-                          <a:cs typeface="Times New Roman"/>
-                        </a:rPr>
-                        <a:t>Sejal</a:t>
-                      </a:r>
-                      <a:r>
-                        <a:rPr lang="en-US" sz="900" dirty="0" smtClean="0">
-                          <a:solidFill>
-                            <a:srgbClr val="000000"/>
-                          </a:solidFill>
-                          <a:effectLst/>
-                          <a:latin typeface="Calibri"/>
-                          <a:ea typeface="Calibri"/>
-                          <a:cs typeface="Times New Roman"/>
-                        </a:rPr>
-                        <a:t> Patel, Antonio Dias</a:t>
-                      </a:r>
-                      <a:endParaRPr lang="en-US" sz="900" dirty="0">
+                      <a:endParaRPr lang="en-US" sz="900" b="0" i="1" dirty="0">
                         <a:solidFill>
                           <a:srgbClr val="000000"/>
                         </a:solidFill>
@@ -9801,9 +8580,21 @@
                           <a:ea typeface="Calibri"/>
                           <a:cs typeface="Times New Roman"/>
                         </a:rPr>
-                        <a:t>Registrar</a:t>
-                      </a:r>
-                      <a:endParaRPr lang="en-US" sz="900" dirty="0">
+                        <a:t>Aimee</a:t>
+                      </a:r>
+                      <a:r>
+                        <a:rPr lang="en-US" sz="900" b="1" baseline="0" dirty="0" smtClean="0">
+                          <a:solidFill>
+                            <a:srgbClr val="000000"/>
+                          </a:solidFill>
+                          <a:effectLst/>
+                          <a:latin typeface="Calibri"/>
+                          <a:ea typeface="Calibri"/>
+                          <a:cs typeface="Times New Roman"/>
+                        </a:rPr>
+                        <a:t> Zhu</a:t>
+                      </a:r>
+                      <a:endParaRPr lang="en-US" sz="900" b="1" dirty="0">
                         <a:solidFill>
                           <a:srgbClr val="000000"/>
                         </a:solidFill>
@@ -9833,18 +8624,18 @@
                         </a:spcAft>
                       </a:pPr>
                       <a:r>
-                        <a:rPr lang="en-US" sz="900" dirty="0" smtClean="0">
+                        <a:rPr lang="en-US" sz="900" b="0" i="1" dirty="0" smtClean="0">
                           <a:solidFill>
                             <a:srgbClr val="000000"/>
                           </a:solidFill>
                           <a:effectLst/>
-                          <a:latin typeface="Calibri"/>
+                          <a:latin typeface="+mn-lt"/>
                           <a:ea typeface="Calibri"/>
                           <a:cs typeface="Times New Roman"/>
                         </a:rPr>
-                        <a:t>Aimee Zhu</a:t>
-                      </a:r>
-                      <a:endParaRPr lang="en-US" sz="900" dirty="0">
+                        <a:t>Registrar</a:t>
+                      </a:r>
+                      <a:endParaRPr lang="en-US" sz="900" b="0" i="1" dirty="0">
                         <a:solidFill>
                           <a:srgbClr val="000000"/>
                         </a:solidFill>
@@ -9876,6 +8667,18 @@
                         </a:spcAft>
                       </a:pPr>
                       <a:r>
+                        <a:rPr lang="en-US" sz="900" b="1" dirty="0" err="1" smtClean="0">
+                          <a:solidFill>
+                            <a:srgbClr val="000000"/>
+                          </a:solidFill>
+                          <a:effectLst/>
+                          <a:latin typeface="Calibri"/>
+                          <a:ea typeface="Calibri"/>
+                          <a:cs typeface="Times New Roman"/>
+                        </a:rPr>
+                        <a:t>Laxmi</a:t>
+                      </a:r>
+                      <a:r>
                         <a:rPr lang="en-US" sz="900" b="1" dirty="0" smtClean="0">
                           <a:solidFill>
                             <a:srgbClr val="000000"/>
@@ -9885,9 +8688,126 @@
                           <a:ea typeface="Calibri"/>
                           <a:cs typeface="Times New Roman"/>
                         </a:rPr>
+                        <a:t> </a:t>
+                      </a:r>
+                      <a:r>
+                        <a:rPr lang="en-US" sz="900" b="1" dirty="0" err="1" smtClean="0">
+                          <a:solidFill>
+                            <a:srgbClr val="000000"/>
+                          </a:solidFill>
+                          <a:effectLst/>
+                          <a:latin typeface="Calibri"/>
+                          <a:ea typeface="Calibri"/>
+                          <a:cs typeface="Times New Roman"/>
+                        </a:rPr>
+                        <a:t>Kambli</a:t>
+                      </a:r>
+                      <a:endParaRPr lang="en-US" sz="900" b="1" dirty="0">
+                        <a:solidFill>
+                          <a:srgbClr val="000000"/>
+                        </a:solidFill>
+                        <a:effectLst/>
+                        <a:latin typeface="Calibri"/>
+                        <a:ea typeface="Calibri"/>
+                        <a:cs typeface="Times New Roman"/>
+                      </a:endParaRPr>
+                    </a:p>
+                  </a:txBody>
+                  <a:tcPr marT="0" marB="0"/>
+                </a:tc>
+                <a:tc>
+                  <a:txBody>
+                    <a:bodyPr/>
+                    <a:lstStyle/>
+                    <a:p>
+                      <a:pPr marL="0" marR="0" indent="0" algn="l" defTabSz="914400" rtl="0" eaLnBrk="1" fontAlgn="auto" latinLnBrk="0" hangingPunct="1">
+                        <a:lnSpc>
+                          <a:spcPct val="115000"/>
+                        </a:lnSpc>
+                        <a:spcBef>
+                          <a:spcPts val="0"/>
+                        </a:spcBef>
+                        <a:spcAft>
+                          <a:spcPts val="0"/>
+                        </a:spcAft>
+                        <a:buClrTx/>
+                        <a:buSzTx/>
+                        <a:buFontTx/>
+                        <a:buNone/>
+                        <a:tabLst/>
+                        <a:defRPr/>
+                      </a:pPr>
+                      <a:r>
+                        <a:rPr lang="en-US" sz="900" b="0" i="1" dirty="0" smtClean="0">
+                          <a:solidFill>
+                            <a:srgbClr val="000000"/>
+                          </a:solidFill>
+                          <a:effectLst/>
+                          <a:latin typeface="+mn-lt"/>
+                          <a:ea typeface="Calibri"/>
+                          <a:cs typeface="Times New Roman"/>
+                        </a:rPr>
                         <a:t>Medical Forms</a:t>
                       </a:r>
-                      <a:endParaRPr lang="en-US" sz="900" dirty="0">
+                    </a:p>
+                  </a:txBody>
+                  <a:tcPr marT="0" marB="0"/>
+                </a:tc>
+              </a:tr>
+              <a:tr h="320354">
+                <a:tc>
+                  <a:txBody>
+                    <a:bodyPr/>
+                    <a:lstStyle/>
+                    <a:p>
+                      <a:pPr marL="0" marR="0">
+                        <a:lnSpc>
+                          <a:spcPct val="115000"/>
+                        </a:lnSpc>
+                        <a:spcBef>
+                          <a:spcPts val="0"/>
+                        </a:spcBef>
+                        <a:spcAft>
+                          <a:spcPts val="0"/>
+                        </a:spcAft>
+                      </a:pPr>
+                      <a:r>
+                        <a:rPr lang="en-US" sz="900" b="1" dirty="0" err="1" smtClean="0">
+                          <a:solidFill>
+                            <a:srgbClr val="000000"/>
+                          </a:solidFill>
+                          <a:effectLst/>
+                          <a:latin typeface="Calibri"/>
+                          <a:ea typeface="Calibri"/>
+                          <a:cs typeface="Times New Roman"/>
+                        </a:rPr>
+                        <a:t>Pradnya</a:t>
+                      </a:r>
+                      <a:r>
+                        <a:rPr lang="en-US" sz="900" b="1" dirty="0" smtClean="0">
+                          <a:solidFill>
+                            <a:srgbClr val="000000"/>
+                          </a:solidFill>
+                          <a:effectLst/>
+                          <a:latin typeface="Calibri"/>
+                          <a:ea typeface="Calibri"/>
+                          <a:cs typeface="Times New Roman"/>
+                        </a:rPr>
+                        <a:t> </a:t>
+                      </a:r>
+                      <a:r>
+                        <a:rPr lang="en-US" sz="900" b="1" dirty="0" err="1" smtClean="0">
+                          <a:solidFill>
+                            <a:srgbClr val="000000"/>
+                          </a:solidFill>
+                          <a:effectLst/>
+                          <a:latin typeface="Calibri"/>
+                          <a:ea typeface="Calibri"/>
+                          <a:cs typeface="Times New Roman"/>
+                        </a:rPr>
+                        <a:t>Goil</a:t>
+                      </a:r>
+                      <a:endParaRPr lang="en-US" sz="900" b="1" dirty="0">
                         <a:solidFill>
                           <a:srgbClr val="000000"/>
                         </a:solidFill>
@@ -9917,7 +8837,7 @@
                         </a:spcAft>
                       </a:pPr>
                       <a:r>
-                        <a:rPr lang="en-US" sz="900" dirty="0" err="1" smtClean="0">
+                        <a:rPr lang="en-US" sz="900" b="0" i="1" dirty="0" smtClean="0">
                           <a:solidFill>
                             <a:srgbClr val="000000"/>
                           </a:solidFill>
@@ -9926,33 +8846,9 @@
                           <a:ea typeface="Calibri"/>
                           <a:cs typeface="Times New Roman"/>
                         </a:rPr>
-                        <a:t>Laxmi</a:t>
-                      </a:r>
-                      <a:r>
-                        <a:rPr lang="en-US" sz="900" dirty="0" smtClean="0">
-                          <a:solidFill>
-                            <a:srgbClr val="000000"/>
-                          </a:solidFill>
-                          <a:effectLst/>
-                          <a:latin typeface="Calibri"/>
-                          <a:ea typeface="Calibri"/>
-                          <a:cs typeface="Times New Roman"/>
-                        </a:rPr>
-                        <a:t> </a:t>
-                      </a:r>
-                      <a:r>
-                        <a:rPr lang="en-US" sz="900" dirty="0" err="1" smtClean="0">
-                          <a:solidFill>
-                            <a:srgbClr val="000000"/>
-                          </a:solidFill>
-                          <a:effectLst/>
-                          <a:latin typeface="Calibri"/>
-                          <a:ea typeface="Calibri"/>
-                          <a:cs typeface="Times New Roman"/>
-                        </a:rPr>
-                        <a:t>Kambli</a:t>
-                      </a:r>
-                      <a:endParaRPr lang="en-US" sz="900" dirty="0">
+                        <a:t>Trek Coordinator</a:t>
+                      </a:r>
+                      <a:endParaRPr lang="en-US" sz="900" b="0" i="1" dirty="0">
                         <a:solidFill>
                           <a:srgbClr val="000000"/>
                         </a:solidFill>
@@ -9984,6 +8880,18 @@
                         </a:spcAft>
                       </a:pPr>
                       <a:r>
+                        <a:rPr lang="en-US" sz="900" b="1" dirty="0" err="1" smtClean="0">
+                          <a:solidFill>
+                            <a:srgbClr val="000000"/>
+                          </a:solidFill>
+                          <a:effectLst/>
+                          <a:latin typeface="Calibri"/>
+                          <a:ea typeface="Calibri"/>
+                          <a:cs typeface="Times New Roman"/>
+                        </a:rPr>
+                        <a:t>Hersh</a:t>
+                      </a:r>
+                      <a:r>
                         <a:rPr lang="en-US" sz="900" b="1" dirty="0" smtClean="0">
                           <a:solidFill>
                             <a:srgbClr val="000000"/>
@@ -9993,10 +8901,10 @@
                           <a:ea typeface="Calibri"/>
                           <a:cs typeface="Times New Roman"/>
                         </a:rPr>
-                        <a:t>Trek</a:t>
-                      </a:r>
-                      <a:r>
-                        <a:rPr lang="en-US" sz="900" b="1" baseline="0" dirty="0" smtClean="0">
+                        <a:t> </a:t>
+                      </a:r>
+                      <a:r>
+                        <a:rPr lang="en-US" sz="900" b="1" dirty="0" err="1" smtClean="0">
                           <a:solidFill>
                             <a:srgbClr val="000000"/>
                           </a:solidFill>
@@ -10005,7 +8913,7 @@
                           <a:ea typeface="Calibri"/>
                           <a:cs typeface="Times New Roman"/>
                         </a:rPr>
-                        <a:t> Coordinator</a:t>
+                        <a:t>Bhargava</a:t>
                       </a:r>
                       <a:endParaRPr lang="en-US" sz="900" b="1" dirty="0">
                         <a:solidFill>
@@ -10037,199 +8945,7 @@
                         </a:spcAft>
                       </a:pPr>
                       <a:r>
-                        <a:rPr lang="en-US" sz="900" dirty="0" smtClean="0">
-                          <a:solidFill>
-                            <a:srgbClr val="000000"/>
-                          </a:solidFill>
-                          <a:effectLst/>
-                          <a:latin typeface="Calibri"/>
-                          <a:ea typeface="Calibri"/>
-                          <a:cs typeface="Times New Roman"/>
-                        </a:rPr>
-                        <a:t>(</a:t>
-                      </a:r>
-                      <a:r>
-                        <a:rPr lang="en-US" sz="900" dirty="0" err="1" smtClean="0">
-                          <a:solidFill>
-                            <a:srgbClr val="000000"/>
-                          </a:solidFill>
-                          <a:effectLst/>
-                          <a:latin typeface="Calibri"/>
-                          <a:ea typeface="Calibri"/>
-                          <a:cs typeface="Times New Roman"/>
-                        </a:rPr>
-                        <a:t>Pushpak</a:t>
-                      </a:r>
-                      <a:r>
-                        <a:rPr lang="en-US" sz="900" dirty="0" smtClean="0">
-                          <a:solidFill>
-                            <a:srgbClr val="000000"/>
-                          </a:solidFill>
-                          <a:effectLst/>
-                          <a:latin typeface="Calibri"/>
-                          <a:ea typeface="Calibri"/>
-                          <a:cs typeface="Times New Roman"/>
-                        </a:rPr>
-                        <a:t> </a:t>
-                      </a:r>
-                      <a:r>
-                        <a:rPr lang="en-US" sz="900" dirty="0" err="1" smtClean="0">
-                          <a:solidFill>
-                            <a:srgbClr val="000000"/>
-                          </a:solidFill>
-                          <a:effectLst/>
-                          <a:latin typeface="Calibri"/>
-                          <a:ea typeface="Calibri"/>
-                          <a:cs typeface="Times New Roman"/>
-                        </a:rPr>
-                        <a:t>Bapat</a:t>
-                      </a:r>
-                      <a:r>
-                        <a:rPr lang="en-US" sz="900" dirty="0" smtClean="0">
-                          <a:solidFill>
-                            <a:srgbClr val="000000"/>
-                          </a:solidFill>
-                          <a:effectLst/>
-                          <a:latin typeface="Calibri"/>
-                          <a:ea typeface="Calibri"/>
-                          <a:cs typeface="Times New Roman"/>
-                        </a:rPr>
-                        <a:t>)  </a:t>
-                      </a:r>
-                      <a:r>
-                        <a:rPr lang="en-US" sz="900" dirty="0" err="1" smtClean="0">
-                          <a:solidFill>
-                            <a:srgbClr val="000000"/>
-                          </a:solidFill>
-                          <a:effectLst/>
-                          <a:latin typeface="Calibri"/>
-                          <a:ea typeface="Calibri"/>
-                          <a:cs typeface="Times New Roman"/>
-                        </a:rPr>
-                        <a:t>Pradnya</a:t>
-                      </a:r>
-                      <a:r>
-                        <a:rPr lang="en-US" sz="900" dirty="0" smtClean="0">
-                          <a:solidFill>
-                            <a:srgbClr val="000000"/>
-                          </a:solidFill>
-                          <a:effectLst/>
-                          <a:latin typeface="Calibri"/>
-                          <a:ea typeface="Calibri"/>
-                          <a:cs typeface="Times New Roman"/>
-                        </a:rPr>
-                        <a:t> </a:t>
-                      </a:r>
-                      <a:r>
-                        <a:rPr lang="en-US" sz="900" dirty="0" err="1" smtClean="0">
-                          <a:solidFill>
-                            <a:srgbClr val="000000"/>
-                          </a:solidFill>
-                          <a:effectLst/>
-                          <a:latin typeface="Calibri"/>
-                          <a:ea typeface="Calibri"/>
-                          <a:cs typeface="Times New Roman"/>
-                        </a:rPr>
-                        <a:t>Goil</a:t>
-                      </a:r>
-                      <a:endParaRPr lang="en-US" sz="900" dirty="0">
-                        <a:solidFill>
-                          <a:srgbClr val="000000"/>
-                        </a:solidFill>
-                        <a:effectLst/>
-                        <a:latin typeface="Calibri"/>
-                        <a:ea typeface="Calibri"/>
-                        <a:cs typeface="Times New Roman"/>
-                      </a:endParaRPr>
-                    </a:p>
-                  </a:txBody>
-                  <a:tcPr marT="0" marB="0"/>
-                </a:tc>
-              </a:tr>
-              <a:tr h="320354">
-                <a:tc>
-                  <a:txBody>
-                    <a:bodyPr/>
-                    <a:lstStyle/>
-                    <a:p>
-                      <a:pPr marL="0" marR="0">
-                        <a:lnSpc>
-                          <a:spcPct val="115000"/>
-                        </a:lnSpc>
-                        <a:spcBef>
-                          <a:spcPts val="0"/>
-                        </a:spcBef>
-                        <a:spcAft>
-                          <a:spcPts val="0"/>
-                        </a:spcAft>
-                      </a:pPr>
-                      <a:r>
-                        <a:rPr lang="en-US" sz="900" b="1" dirty="0" err="1" smtClean="0">
-                          <a:solidFill>
-                            <a:srgbClr val="000000"/>
-                          </a:solidFill>
-                          <a:effectLst/>
-                          <a:latin typeface="Calibri"/>
-                          <a:ea typeface="Calibri"/>
-                          <a:cs typeface="Times New Roman"/>
-                        </a:rPr>
-                        <a:t>Hersh</a:t>
-                      </a:r>
-                      <a:r>
-                        <a:rPr lang="en-US" sz="900" b="1" dirty="0" smtClean="0">
-                          <a:solidFill>
-                            <a:srgbClr val="000000"/>
-                          </a:solidFill>
-                          <a:effectLst/>
-                          <a:latin typeface="Calibri"/>
-                          <a:ea typeface="Calibri"/>
-                          <a:cs typeface="Times New Roman"/>
-                        </a:rPr>
-                        <a:t> </a:t>
-                      </a:r>
-                      <a:r>
-                        <a:rPr lang="en-US" sz="900" b="1" dirty="0" err="1" smtClean="0">
-                          <a:solidFill>
-                            <a:srgbClr val="000000"/>
-                          </a:solidFill>
-                          <a:effectLst/>
-                          <a:latin typeface="Calibri"/>
-                          <a:ea typeface="Calibri"/>
-                          <a:cs typeface="Times New Roman"/>
-                        </a:rPr>
-                        <a:t>Bhargava</a:t>
-                      </a:r>
-                      <a:endParaRPr lang="en-US" sz="900" b="1" dirty="0">
-                        <a:solidFill>
-                          <a:srgbClr val="000000"/>
-                        </a:solidFill>
-                        <a:effectLst/>
-                        <a:latin typeface="Calibri"/>
-                        <a:ea typeface="Calibri"/>
-                        <a:cs typeface="Times New Roman"/>
-                      </a:endParaRPr>
-                    </a:p>
-                  </a:txBody>
-                  <a:tcPr marT="0" marB="0"/>
-                </a:tc>
-                <a:tc>
-                  <a:txBody>
-                    <a:bodyPr/>
-                    <a:lstStyle/>
-                    <a:p>
-                      <a:pPr marL="0" marR="0">
-                        <a:lnSpc>
-                          <a:spcPct val="115000"/>
-                        </a:lnSpc>
-                        <a:spcBef>
-                          <a:spcPts val="0"/>
-                        </a:spcBef>
-                        <a:spcAft>
-                          <a:spcPts val="0"/>
-                        </a:spcAft>
-                      </a:pPr>
-                      <a:r>
-                        <a:rPr lang="en-US" sz="900" dirty="0" smtClean="0">
+                        <a:rPr lang="en-US" sz="900" b="0" i="1" dirty="0" smtClean="0">
                           <a:solidFill>
                             <a:srgbClr val="000000"/>
                           </a:solidFill>
@@ -10240,7 +8956,7 @@
                         </a:rPr>
                         <a:t>Friends Of Scouting Coordinator</a:t>
                       </a:r>
-                      <a:endParaRPr lang="en-US" sz="900" dirty="0">
+                      <a:endParaRPr lang="en-US" sz="900" b="0" i="1" dirty="0">
                         <a:solidFill>
                           <a:srgbClr val="000000"/>
                         </a:solidFill>

</xml_diff>